<commit_message>
fix: lambda functions are now checked first doc: presentation doc now has auc«xiliar functions
</commit_message>
<xml_diff>
--- a/2024-03-08-Presentation.pptx
+++ b/2024-03-08-Presentation.pptx
@@ -5,10 +5,10 @@
     <p:sldMasterId id="2147483648" r:id="rId4"/>
   </p:sldMasterIdLst>
   <p:notesMasterIdLst>
-    <p:notesMasterId r:id="rId13"/>
+    <p:notesMasterId r:id="rId17"/>
   </p:notesMasterIdLst>
   <p:handoutMasterIdLst>
-    <p:handoutMasterId r:id="rId14"/>
+    <p:handoutMasterId r:id="rId18"/>
   </p:handoutMasterIdLst>
   <p:sldIdLst>
     <p:sldId id="256" r:id="rId5"/>
@@ -18,7 +18,11 @@
     <p:sldId id="288" r:id="rId9"/>
     <p:sldId id="290" r:id="rId10"/>
     <p:sldId id="291" r:id="rId11"/>
-    <p:sldId id="271" r:id="rId12"/>
+    <p:sldId id="294" r:id="rId12"/>
+    <p:sldId id="296" r:id="rId13"/>
+    <p:sldId id="297" r:id="rId14"/>
+    <p:sldId id="298" r:id="rId15"/>
+    <p:sldId id="271" r:id="rId16"/>
   </p:sldIdLst>
   <p:sldSz cx="12192000" cy="6858000"/>
   <p:notesSz cx="6858000" cy="9144000"/>
@@ -791,7 +795,7 @@
           <a:p>
             <a:fld id="{28EEFA9E-C190-4F5C-8394-BD5F1CD55C02}" type="slidenum">
               <a:rPr lang="en-US" smtClean="0"/>
-              <a:t>‹#›</a:t>
+              <a:t>‹nº›</a:t>
             </a:fld>
             <a:endParaRPr lang="en-US" dirty="0"/>
           </a:p>
@@ -1048,7 +1052,7 @@
           <a:p>
             <a:fld id="{22289C57-55D7-40A4-A101-E74FAC7A092B}" type="slidenum">
               <a:rPr lang="en-US" smtClean="0"/>
-              <a:t>‹#›</a:t>
+              <a:t>‹nº›</a:t>
             </a:fld>
             <a:endParaRPr lang="en-US" dirty="0"/>
           </a:p>
@@ -1390,7 +1394,7 @@
           <a:p>
             <a:fld id="{22289C57-55D7-40A4-A101-E74FAC7A092B}" type="slidenum">
               <a:rPr lang="en-US" smtClean="0"/>
-              <a:t>8</a:t>
+              <a:t>12</a:t>
             </a:fld>
             <a:endParaRPr lang="en-US" dirty="0"/>
           </a:p>
@@ -1812,7 +1816,7 @@
             <a:fld id="{A49DFD55-3C28-40EF-9E31-A92D2E4017FF}" type="slidenum">
               <a:rPr lang="en-US" smtClean="0"/>
               <a:pPr/>
-              <a:t>‹#›</a:t>
+              <a:t>‹nº›</a:t>
             </a:fld>
             <a:endParaRPr lang="en-US" dirty="0"/>
           </a:p>
@@ -2459,7 +2463,7 @@
             <a:fld id="{A49DFD55-3C28-40EF-9E31-A92D2E4017FF}" type="slidenum">
               <a:rPr lang="en-US" smtClean="0"/>
               <a:pPr/>
-              <a:t>‹#›</a:t>
+              <a:t>‹nº›</a:t>
             </a:fld>
             <a:endParaRPr lang="en-US" dirty="0"/>
           </a:p>
@@ -2805,7 +2809,7 @@
             <a:fld id="{A49DFD55-3C28-40EF-9E31-A92D2E4017FF}" type="slidenum">
               <a:rPr lang="en-US" smtClean="0"/>
               <a:pPr/>
-              <a:t>‹#›</a:t>
+              <a:t>‹nº›</a:t>
             </a:fld>
             <a:endParaRPr lang="en-US" dirty="0"/>
           </a:p>
@@ -3080,7 +3084,7 @@
             <a:fld id="{A49DFD55-3C28-40EF-9E31-A92D2E4017FF}" type="slidenum">
               <a:rPr lang="en-US" smtClean="0"/>
               <a:pPr/>
-              <a:t>‹#›</a:t>
+              <a:t>‹nº›</a:t>
             </a:fld>
             <a:endParaRPr lang="en-US" dirty="0"/>
           </a:p>
@@ -3410,7 +3414,7 @@
             <a:fld id="{A49DFD55-3C28-40EF-9E31-A92D2E4017FF}" type="slidenum">
               <a:rPr lang="en-US" smtClean="0"/>
               <a:pPr/>
-              <a:t>‹#›</a:t>
+              <a:t>‹nº›</a:t>
             </a:fld>
             <a:endParaRPr lang="en-US" dirty="0"/>
           </a:p>
@@ -4280,7 +4284,7 @@
             <a:fld id="{A49DFD55-3C28-40EF-9E31-A92D2E4017FF}" type="slidenum">
               <a:rPr lang="en-US" smtClean="0"/>
               <a:pPr/>
-              <a:t>‹#›</a:t>
+              <a:t>‹nº›</a:t>
             </a:fld>
             <a:endParaRPr lang="en-US" dirty="0"/>
           </a:p>
@@ -4992,7 +4996,7 @@
             <a:fld id="{A49DFD55-3C28-40EF-9E31-A92D2E4017FF}" type="slidenum">
               <a:rPr lang="en-US" smtClean="0"/>
               <a:pPr/>
-              <a:t>‹#›</a:t>
+              <a:t>‹nº›</a:t>
             </a:fld>
             <a:endParaRPr lang="en-US" dirty="0"/>
           </a:p>
@@ -5647,7 +5651,7 @@
             <a:fld id="{A49DFD55-3C28-40EF-9E31-A92D2E4017FF}" type="slidenum">
               <a:rPr lang="en-US" smtClean="0"/>
               <a:pPr/>
-              <a:t>‹#›</a:t>
+              <a:t>‹nº›</a:t>
             </a:fld>
             <a:endParaRPr lang="en-US" dirty="0"/>
           </a:p>
@@ -6036,7 +6040,7 @@
             <a:fld id="{A49DFD55-3C28-40EF-9E31-A92D2E4017FF}" type="slidenum">
               <a:rPr lang="en-US" smtClean="0"/>
               <a:pPr/>
-              <a:t>‹#›</a:t>
+              <a:t>‹nº›</a:t>
             </a:fld>
             <a:endParaRPr lang="en-US" dirty="0"/>
           </a:p>
@@ -6440,7 +6444,7 @@
           <a:p>
             <a:fld id="{A49DFD55-3C28-40EF-9E31-A92D2E4017FF}" type="slidenum">
               <a:rPr lang="en-US" smtClean="0"/>
-              <a:t>‹#›</a:t>
+              <a:t>‹nº›</a:t>
             </a:fld>
             <a:endParaRPr lang="en-US" dirty="0"/>
           </a:p>
@@ -6899,7 +6903,7 @@
 </p:sld>
 </file>
 
-<file path=ppt/slides/slide2.xml><?xml version="1.0" encoding="utf-8"?>
+<file path=ppt/slides/slide10.xml><?xml version="1.0" encoding="utf-8"?>
 <p:sld xmlns:a="http://schemas.openxmlformats.org/drawingml/2006/main" xmlns:r="http://schemas.openxmlformats.org/officeDocument/2006/relationships" xmlns:p="http://schemas.openxmlformats.org/presentationml/2006/main">
   <p:cSld>
     <p:spTree>
@@ -6918,372 +6922,6 @@
       </p:grpSpPr>
       <p:sp>
         <p:nvSpPr>
-          <p:cNvPr id="2" name="Title 1">
-            <a:extLst>
-              <a:ext uri="{FF2B5EF4-FFF2-40B4-BE49-F238E27FC236}">
-                <a16:creationId xmlns:a16="http://schemas.microsoft.com/office/drawing/2014/main" id="{1BEF5859-10C9-4588-9727-B9362E26C29D}"/>
-              </a:ext>
-            </a:extLst>
-          </p:cNvPr>
-          <p:cNvSpPr>
-            <a:spLocks noGrp="1"/>
-          </p:cNvSpPr>
-          <p:nvPr>
-            <p:ph type="title"/>
-          </p:nvPr>
-        </p:nvSpPr>
-        <p:spPr>
-          <a:xfrm>
-            <a:off x="553853" y="1020445"/>
-            <a:ext cx="3796766" cy="1325563"/>
-          </a:xfrm>
-        </p:spPr>
-        <p:txBody>
-          <a:bodyPr/>
-          <a:lstStyle/>
-          <a:p>
-            <a:r>
-              <a:rPr lang="en-US" dirty="0"/>
-              <a:t>AGENDA</a:t>
-            </a:r>
-          </a:p>
-        </p:txBody>
-      </p:sp>
-      <p:sp>
-        <p:nvSpPr>
-          <p:cNvPr id="3" name="Content Placeholder 2">
-            <a:extLst>
-              <a:ext uri="{FF2B5EF4-FFF2-40B4-BE49-F238E27FC236}">
-                <a16:creationId xmlns:a16="http://schemas.microsoft.com/office/drawing/2014/main" id="{5671D7E5-EF66-4BCD-8DAA-E9061157F0BE}"/>
-              </a:ext>
-            </a:extLst>
-          </p:cNvPr>
-          <p:cNvSpPr>
-            <a:spLocks noGrp="1"/>
-          </p:cNvSpPr>
-          <p:nvPr>
-            <p:ph idx="1"/>
-          </p:nvPr>
-        </p:nvSpPr>
-        <p:spPr>
-          <a:xfrm>
-            <a:off x="553853" y="2674013"/>
-            <a:ext cx="3796766" cy="3269589"/>
-          </a:xfrm>
-        </p:spPr>
-        <p:txBody>
-          <a:bodyPr>
-            <a:normAutofit/>
-          </a:bodyPr>
-          <a:lstStyle/>
-          <a:p>
-            <a:r>
-              <a:rPr lang="en-US" dirty="0"/>
-              <a:t>Basic functions and operations</a:t>
-            </a:r>
-          </a:p>
-          <a:p>
-            <a:r>
-              <a:rPr lang="en-US" dirty="0"/>
-              <a:t>Use of structs</a:t>
-            </a:r>
-          </a:p>
-          <a:p>
-            <a:r>
-              <a:rPr lang="en-US" dirty="0"/>
-              <a:t>REWL</a:t>
-            </a:r>
-          </a:p>
-          <a:p>
-            <a:r>
-              <a:rPr lang="en-US" dirty="0"/>
-              <a:t>Reflection</a:t>
-            </a:r>
-          </a:p>
-          <a:p>
-            <a:r>
-              <a:rPr lang="en-US" dirty="0"/>
-              <a:t>Metaprogramming</a:t>
-            </a:r>
-          </a:p>
-        </p:txBody>
-      </p:sp>
-      <p:sp>
-        <p:nvSpPr>
-          <p:cNvPr id="5" name="Slide Number Placeholder 5">
-            <a:extLst>
-              <a:ext uri="{FF2B5EF4-FFF2-40B4-BE49-F238E27FC236}">
-                <a16:creationId xmlns:a16="http://schemas.microsoft.com/office/drawing/2014/main" id="{B02A8827-B1A1-2D2F-D6DD-E886B886C43E}"/>
-              </a:ext>
-            </a:extLst>
-          </p:cNvPr>
-          <p:cNvSpPr>
-            <a:spLocks noGrp="1"/>
-          </p:cNvSpPr>
-          <p:nvPr>
-            <p:ph type="sldNum" sz="quarter" idx="12"/>
-          </p:nvPr>
-        </p:nvSpPr>
-        <p:spPr>
-          <a:xfrm>
-            <a:off x="10373350" y="6356349"/>
-            <a:ext cx="987552" cy="365125"/>
-          </a:xfrm>
-        </p:spPr>
-        <p:txBody>
-          <a:bodyPr/>
-          <a:lstStyle/>
-          <a:p>
-            <a:fld id="{A49DFD55-3C28-40EF-9E31-A92D2E4017FF}" type="slidenum">
-              <a:rPr lang="en-US" smtClean="0"/>
-              <a:pPr/>
-              <a:t>2</a:t>
-            </a:fld>
-            <a:endParaRPr lang="en-US" dirty="0"/>
-          </a:p>
-        </p:txBody>
-      </p:sp>
-    </p:spTree>
-    <p:extLst>
-      <p:ext uri="{BB962C8B-B14F-4D97-AF65-F5344CB8AC3E}">
-        <p14:creationId xmlns:p14="http://schemas.microsoft.com/office/powerpoint/2010/main" val="1713219598"/>
-      </p:ext>
-    </p:extLst>
-  </p:cSld>
-  <p:clrMapOvr>
-    <a:masterClrMapping/>
-  </p:clrMapOvr>
-</p:sld>
-</file>
-
-<file path=ppt/slides/slide3.xml><?xml version="1.0" encoding="utf-8"?>
-<p:sld xmlns:a="http://schemas.openxmlformats.org/drawingml/2006/main" xmlns:r="http://schemas.openxmlformats.org/officeDocument/2006/relationships" xmlns:p="http://schemas.openxmlformats.org/presentationml/2006/main">
-  <p:cSld>
-    <p:spTree>
-      <p:nvGrpSpPr>
-        <p:cNvPr id="1" name=""/>
-        <p:cNvGrpSpPr/>
-        <p:nvPr/>
-      </p:nvGrpSpPr>
-      <p:grpSpPr>
-        <a:xfrm>
-          <a:off x="0" y="0"/>
-          <a:ext cx="0" cy="0"/>
-          <a:chOff x="0" y="0"/>
-          <a:chExt cx="0" cy="0"/>
-        </a:xfrm>
-      </p:grpSpPr>
-      <p:sp>
-        <p:nvSpPr>
-          <p:cNvPr id="5" name="Slide Number Placeholder 4">
-            <a:extLst>
-              <a:ext uri="{FF2B5EF4-FFF2-40B4-BE49-F238E27FC236}">
-                <a16:creationId xmlns:a16="http://schemas.microsoft.com/office/drawing/2014/main" id="{78138769-92F5-4A6E-6BE7-4DD65A86294D}"/>
-              </a:ext>
-            </a:extLst>
-          </p:cNvPr>
-          <p:cNvSpPr>
-            <a:spLocks noGrp="1"/>
-          </p:cNvSpPr>
-          <p:nvPr>
-            <p:ph type="sldNum" sz="quarter" idx="12"/>
-          </p:nvPr>
-        </p:nvSpPr>
-        <p:spPr/>
-        <p:txBody>
-          <a:bodyPr/>
-          <a:lstStyle/>
-          <a:p>
-            <a:fld id="{A49DFD55-3C28-40EF-9E31-A92D2E4017FF}" type="slidenum">
-              <a:rPr lang="en-US" smtClean="0"/>
-              <a:pPr/>
-              <a:t>3</a:t>
-            </a:fld>
-            <a:endParaRPr lang="en-US" dirty="0"/>
-          </a:p>
-        </p:txBody>
-      </p:sp>
-      <p:pic>
-        <p:nvPicPr>
-          <p:cNvPr id="7" name="Picture 6">
-            <a:extLst>
-              <a:ext uri="{FF2B5EF4-FFF2-40B4-BE49-F238E27FC236}">
-                <a16:creationId xmlns:a16="http://schemas.microsoft.com/office/drawing/2014/main" id="{638EF26F-D880-E5CD-7A5D-C08F42F4CF90}"/>
-              </a:ext>
-            </a:extLst>
-          </p:cNvPr>
-          <p:cNvPicPr>
-            <a:picLocks noChangeAspect="1"/>
-          </p:cNvPicPr>
-          <p:nvPr/>
-        </p:nvPicPr>
-        <p:blipFill>
-          <a:blip r:embed="rId2"/>
-          <a:stretch>
-            <a:fillRect/>
-          </a:stretch>
-        </p:blipFill>
-        <p:spPr>
-          <a:xfrm>
-            <a:off x="1778000" y="2849095"/>
-            <a:ext cx="7498446" cy="1661945"/>
-          </a:xfrm>
-          <a:prstGeom prst="rect">
-            <a:avLst/>
-          </a:prstGeom>
-        </p:spPr>
-      </p:pic>
-      <p:pic>
-        <p:nvPicPr>
-          <p:cNvPr id="9" name="Picture 8">
-            <a:extLst>
-              <a:ext uri="{FF2B5EF4-FFF2-40B4-BE49-F238E27FC236}">
-                <a16:creationId xmlns:a16="http://schemas.microsoft.com/office/drawing/2014/main" id="{3AF308F6-1A87-BA62-5EE7-92D361F9600C}"/>
-              </a:ext>
-            </a:extLst>
-          </p:cNvPr>
-          <p:cNvPicPr>
-            <a:picLocks noChangeAspect="1"/>
-          </p:cNvPicPr>
-          <p:nvPr/>
-        </p:nvPicPr>
-        <p:blipFill>
-          <a:blip r:embed="rId3"/>
-          <a:stretch>
-            <a:fillRect/>
-          </a:stretch>
-        </p:blipFill>
-        <p:spPr>
-          <a:xfrm>
-            <a:off x="1778000" y="4768802"/>
-            <a:ext cx="7376160" cy="1189957"/>
-          </a:xfrm>
-          <a:prstGeom prst="rect">
-            <a:avLst/>
-          </a:prstGeom>
-        </p:spPr>
-      </p:pic>
-      <p:sp>
-        <p:nvSpPr>
-          <p:cNvPr id="11" name="TextBox 10">
-            <a:extLst>
-              <a:ext uri="{FF2B5EF4-FFF2-40B4-BE49-F238E27FC236}">
-                <a16:creationId xmlns:a16="http://schemas.microsoft.com/office/drawing/2014/main" id="{9C50F531-062B-30A8-0EFA-1828B8452648}"/>
-              </a:ext>
-            </a:extLst>
-          </p:cNvPr>
-          <p:cNvSpPr txBox="1"/>
-          <p:nvPr/>
-        </p:nvSpPr>
-        <p:spPr>
-          <a:xfrm>
-            <a:off x="1778000" y="1114005"/>
-            <a:ext cx="6096000" cy="1477328"/>
-          </a:xfrm>
-          <a:prstGeom prst="rect">
-            <a:avLst/>
-          </a:prstGeom>
-          <a:noFill/>
-        </p:spPr>
-        <p:txBody>
-          <a:bodyPr wrap="square">
-            <a:spAutoFit/>
-          </a:bodyPr>
-          <a:lstStyle/>
-          <a:p>
-            <a:r>
-              <a:rPr lang="en-US" dirty="0"/>
-              <a:t>We separated the most basic calls in other files. So, a </a:t>
-            </a:r>
-            <a:r>
-              <a:rPr lang="en-US" dirty="0" err="1"/>
-              <a:t>dict</a:t>
-            </a:r>
-            <a:r>
-              <a:rPr lang="en-US" dirty="0"/>
-              <a:t> defines for basic operations which action should be performed. </a:t>
-            </a:r>
-          </a:p>
-          <a:p>
-            <a:endParaRPr lang="en-US" dirty="0"/>
-          </a:p>
-          <a:p>
-            <a:r>
-              <a:rPr lang="en-US" dirty="0"/>
-              <a:t>This leads to a clean design and better maintainability.</a:t>
-            </a:r>
-          </a:p>
-        </p:txBody>
-      </p:sp>
-      <p:sp>
-        <p:nvSpPr>
-          <p:cNvPr id="13" name="TextBox 12">
-            <a:extLst>
-              <a:ext uri="{FF2B5EF4-FFF2-40B4-BE49-F238E27FC236}">
-                <a16:creationId xmlns:a16="http://schemas.microsoft.com/office/drawing/2014/main" id="{853145E0-382C-887A-9444-68B889CA5382}"/>
-              </a:ext>
-            </a:extLst>
-          </p:cNvPr>
-          <p:cNvSpPr txBox="1"/>
-          <p:nvPr/>
-        </p:nvSpPr>
-        <p:spPr>
-          <a:xfrm>
-            <a:off x="1778000" y="517132"/>
-            <a:ext cx="6096000" cy="369332"/>
-          </a:xfrm>
-          <a:prstGeom prst="rect">
-            <a:avLst/>
-          </a:prstGeom>
-          <a:noFill/>
-        </p:spPr>
-        <p:txBody>
-          <a:bodyPr wrap="square">
-            <a:spAutoFit/>
-          </a:bodyPr>
-          <a:lstStyle/>
-          <a:p>
-            <a:r>
-              <a:rPr lang="en-US" b="1" dirty="0">
-                <a:latin typeface="+mj-lt"/>
-              </a:rPr>
-              <a:t>Basic functions and operations</a:t>
-            </a:r>
-          </a:p>
-        </p:txBody>
-      </p:sp>
-    </p:spTree>
-    <p:extLst>
-      <p:ext uri="{BB962C8B-B14F-4D97-AF65-F5344CB8AC3E}">
-        <p14:creationId xmlns:p14="http://schemas.microsoft.com/office/powerpoint/2010/main" val="2827551494"/>
-      </p:ext>
-    </p:extLst>
-  </p:cSld>
-  <p:clrMapOvr>
-    <a:masterClrMapping/>
-  </p:clrMapOvr>
-</p:sld>
-</file>
-
-<file path=ppt/slides/slide4.xml><?xml version="1.0" encoding="utf-8"?>
-<p:sld xmlns:a="http://schemas.openxmlformats.org/drawingml/2006/main" xmlns:r="http://schemas.openxmlformats.org/officeDocument/2006/relationships" xmlns:p="http://schemas.openxmlformats.org/presentationml/2006/main">
-  <p:cSld>
-    <p:spTree>
-      <p:nvGrpSpPr>
-        <p:cNvPr id="1" name=""/>
-        <p:cNvGrpSpPr/>
-        <p:nvPr/>
-      </p:nvGrpSpPr>
-      <p:grpSpPr>
-        <a:xfrm>
-          <a:off x="0" y="0"/>
-          <a:ext cx="0" cy="0"/>
-          <a:chOff x="0" y="0"/>
-          <a:chExt cx="0" cy="0"/>
-        </a:xfrm>
-      </p:grpSpPr>
-      <p:sp>
-        <p:nvSpPr>
           <p:cNvPr id="7" name="Slide Number Placeholder 6">
             <a:extLst>
               <a:ext uri="{FF2B5EF4-FFF2-40B4-BE49-F238E27FC236}">
@@ -7306,7 +6944,7 @@
             <a:fld id="{A49DFD55-3C28-40EF-9E31-A92D2E4017FF}" type="slidenum">
               <a:rPr lang="en-US" smtClean="0"/>
               <a:pPr/>
-              <a:t>4</a:t>
+              <a:t>10</a:t>
             </a:fld>
             <a:endParaRPr lang="en-US" dirty="0"/>
           </a:p>
@@ -7435,11 +7073,1093 @@
             </a:lvl9pPr>
           </a:lstStyle>
           <a:p>
+            <a:endParaRPr lang="en-US" dirty="0"/>
+          </a:p>
+        </p:txBody>
+      </p:sp>
+      <p:sp>
+        <p:nvSpPr>
+          <p:cNvPr id="11" name="TextBox 10">
+            <a:extLst>
+              <a:ext uri="{FF2B5EF4-FFF2-40B4-BE49-F238E27FC236}">
+                <a16:creationId xmlns:a16="http://schemas.microsoft.com/office/drawing/2014/main" id="{0C5D619A-C374-B2F8-3F2A-35CA1A45FA66}"/>
+              </a:ext>
+            </a:extLst>
+          </p:cNvPr>
+          <p:cNvSpPr txBox="1"/>
+          <p:nvPr/>
+        </p:nvSpPr>
+        <p:spPr>
+          <a:xfrm>
+            <a:off x="1250302" y="1114005"/>
+            <a:ext cx="6623698" cy="646331"/>
+          </a:xfrm>
+          <a:prstGeom prst="rect">
+            <a:avLst/>
+          </a:prstGeom>
+          <a:noFill/>
+        </p:spPr>
+        <p:txBody>
+          <a:bodyPr wrap="square">
+            <a:spAutoFit/>
+          </a:bodyPr>
+          <a:lstStyle/>
+          <a:p>
+            <a:r>
+              <a:rPr lang="en-US" dirty="0"/>
+              <a:t>For better a better comprehension and to avoid code duplication, we created helper functions to handle the environments</a:t>
+            </a:r>
+          </a:p>
+        </p:txBody>
+      </p:sp>
+      <p:sp>
+        <p:nvSpPr>
+          <p:cNvPr id="12" name="TextBox 11">
+            <a:extLst>
+              <a:ext uri="{FF2B5EF4-FFF2-40B4-BE49-F238E27FC236}">
+                <a16:creationId xmlns:a16="http://schemas.microsoft.com/office/drawing/2014/main" id="{28689290-2634-4BDD-5E37-ECA5D4DD45A9}"/>
+              </a:ext>
+            </a:extLst>
+          </p:cNvPr>
+          <p:cNvSpPr txBox="1"/>
+          <p:nvPr/>
+        </p:nvSpPr>
+        <p:spPr>
+          <a:xfrm>
+            <a:off x="1778000" y="517132"/>
+            <a:ext cx="6096000" cy="369332"/>
+          </a:xfrm>
+          <a:prstGeom prst="rect">
+            <a:avLst/>
+          </a:prstGeom>
+          <a:noFill/>
+        </p:spPr>
+        <p:txBody>
+          <a:bodyPr wrap="square">
+            <a:spAutoFit/>
+          </a:bodyPr>
+          <a:lstStyle/>
+          <a:p>
+            <a:r>
+              <a:rPr lang="en-US" b="1" dirty="0">
+                <a:latin typeface="+mj-lt"/>
+              </a:rPr>
+              <a:t>Use of environment handlers</a:t>
+            </a:r>
+          </a:p>
+        </p:txBody>
+      </p:sp>
+      <p:pic>
+        <p:nvPicPr>
+          <p:cNvPr id="3" name="Imagem 2">
+            <a:extLst>
+              <a:ext uri="{FF2B5EF4-FFF2-40B4-BE49-F238E27FC236}">
+                <a16:creationId xmlns:a16="http://schemas.microsoft.com/office/drawing/2014/main" id="{434F8C51-C72B-298F-D7E9-A076B21BE4E8}"/>
+              </a:ext>
+            </a:extLst>
+          </p:cNvPr>
+          <p:cNvPicPr>
+            <a:picLocks noChangeAspect="1"/>
+          </p:cNvPicPr>
+          <p:nvPr/>
+        </p:nvPicPr>
+        <p:blipFill>
+          <a:blip r:embed="rId2"/>
+          <a:stretch>
+            <a:fillRect/>
+          </a:stretch>
+        </p:blipFill>
+        <p:spPr>
+          <a:xfrm>
+            <a:off x="915170" y="2108627"/>
+            <a:ext cx="5677692" cy="4096322"/>
+          </a:xfrm>
+          <a:prstGeom prst="rect">
+            <a:avLst/>
+          </a:prstGeom>
+        </p:spPr>
+      </p:pic>
+      <p:pic>
+        <p:nvPicPr>
+          <p:cNvPr id="14" name="Imagem 13">
+            <a:extLst>
+              <a:ext uri="{FF2B5EF4-FFF2-40B4-BE49-F238E27FC236}">
+                <a16:creationId xmlns:a16="http://schemas.microsoft.com/office/drawing/2014/main" id="{D382B973-94BF-70B9-7F2F-5D5E3E6DC343}"/>
+              </a:ext>
+            </a:extLst>
+          </p:cNvPr>
+          <p:cNvPicPr>
+            <a:picLocks noChangeAspect="1"/>
+          </p:cNvPicPr>
+          <p:nvPr/>
+        </p:nvPicPr>
+        <p:blipFill>
+          <a:blip r:embed="rId3"/>
+          <a:stretch>
+            <a:fillRect/>
+          </a:stretch>
+        </p:blipFill>
+        <p:spPr>
+          <a:xfrm>
+            <a:off x="6592862" y="2396174"/>
+            <a:ext cx="4629796" cy="628738"/>
+          </a:xfrm>
+          <a:prstGeom prst="rect">
+            <a:avLst/>
+          </a:prstGeom>
+        </p:spPr>
+      </p:pic>
+      <p:pic>
+        <p:nvPicPr>
+          <p:cNvPr id="16" name="Imagem 15">
+            <a:extLst>
+              <a:ext uri="{FF2B5EF4-FFF2-40B4-BE49-F238E27FC236}">
+                <a16:creationId xmlns:a16="http://schemas.microsoft.com/office/drawing/2014/main" id="{63B3450B-68B7-C840-98E2-317B6ED90477}"/>
+              </a:ext>
+            </a:extLst>
+          </p:cNvPr>
+          <p:cNvPicPr>
+            <a:picLocks noChangeAspect="1"/>
+          </p:cNvPicPr>
+          <p:nvPr/>
+        </p:nvPicPr>
+        <p:blipFill>
+          <a:blip r:embed="rId4"/>
+          <a:stretch>
+            <a:fillRect/>
+          </a:stretch>
+        </p:blipFill>
+        <p:spPr>
+          <a:xfrm>
+            <a:off x="6580278" y="3574182"/>
+            <a:ext cx="4286848" cy="1762371"/>
+          </a:xfrm>
+          <a:prstGeom prst="rect">
+            <a:avLst/>
+          </a:prstGeom>
+        </p:spPr>
+      </p:pic>
+    </p:spTree>
+    <p:extLst>
+      <p:ext uri="{BB962C8B-B14F-4D97-AF65-F5344CB8AC3E}">
+        <p14:creationId xmlns:p14="http://schemas.microsoft.com/office/powerpoint/2010/main" val="1942308049"/>
+      </p:ext>
+    </p:extLst>
+  </p:cSld>
+  <p:clrMapOvr>
+    <a:masterClrMapping/>
+  </p:clrMapOvr>
+</p:sld>
+</file>
+
+<file path=ppt/slides/slide11.xml><?xml version="1.0" encoding="utf-8"?>
+<p:sld xmlns:a="http://schemas.openxmlformats.org/drawingml/2006/main" xmlns:r="http://schemas.openxmlformats.org/officeDocument/2006/relationships" xmlns:p="http://schemas.openxmlformats.org/presentationml/2006/main">
+  <p:cSld>
+    <p:spTree>
+      <p:nvGrpSpPr>
+        <p:cNvPr id="1" name=""/>
+        <p:cNvGrpSpPr/>
+        <p:nvPr/>
+      </p:nvGrpSpPr>
+      <p:grpSpPr>
+        <a:xfrm>
+          <a:off x="0" y="0"/>
+          <a:ext cx="0" cy="0"/>
+          <a:chOff x="0" y="0"/>
+          <a:chExt cx="0" cy="0"/>
+        </a:xfrm>
+      </p:grpSpPr>
+      <p:sp>
+        <p:nvSpPr>
+          <p:cNvPr id="5" name="Slide Number Placeholder 4">
+            <a:extLst>
+              <a:ext uri="{FF2B5EF4-FFF2-40B4-BE49-F238E27FC236}">
+                <a16:creationId xmlns:a16="http://schemas.microsoft.com/office/drawing/2014/main" id="{78138769-92F5-4A6E-6BE7-4DD65A86294D}"/>
+              </a:ext>
+            </a:extLst>
+          </p:cNvPr>
+          <p:cNvSpPr>
+            <a:spLocks noGrp="1"/>
+          </p:cNvSpPr>
+          <p:nvPr>
+            <p:ph type="sldNum" sz="quarter" idx="12"/>
+          </p:nvPr>
+        </p:nvSpPr>
+        <p:spPr/>
+        <p:txBody>
+          <a:bodyPr/>
+          <a:lstStyle/>
+          <a:p>
+            <a:fld id="{A49DFD55-3C28-40EF-9E31-A92D2E4017FF}" type="slidenum">
+              <a:rPr lang="en-US" smtClean="0"/>
+              <a:pPr/>
+              <a:t>11</a:t>
+            </a:fld>
+            <a:endParaRPr lang="en-US" dirty="0"/>
+          </a:p>
+        </p:txBody>
+      </p:sp>
+      <p:sp>
+        <p:nvSpPr>
+          <p:cNvPr id="11" name="TextBox 10">
+            <a:extLst>
+              <a:ext uri="{FF2B5EF4-FFF2-40B4-BE49-F238E27FC236}">
+                <a16:creationId xmlns:a16="http://schemas.microsoft.com/office/drawing/2014/main" id="{9C50F531-062B-30A8-0EFA-1828B8452648}"/>
+              </a:ext>
+            </a:extLst>
+          </p:cNvPr>
+          <p:cNvSpPr txBox="1"/>
+          <p:nvPr/>
+        </p:nvSpPr>
+        <p:spPr>
+          <a:xfrm>
+            <a:off x="916533" y="1185841"/>
+            <a:ext cx="7798259" cy="369332"/>
+          </a:xfrm>
+          <a:prstGeom prst="rect">
+            <a:avLst/>
+          </a:prstGeom>
+          <a:noFill/>
+        </p:spPr>
+        <p:txBody>
+          <a:bodyPr wrap="square">
+            <a:spAutoFit/>
+          </a:bodyPr>
+          <a:lstStyle/>
+          <a:p>
+            <a:r>
+              <a:rPr lang="en-US" dirty="0"/>
+              <a:t>These were created to avoid code duplication</a:t>
+            </a:r>
+          </a:p>
+        </p:txBody>
+      </p:sp>
+      <p:sp>
+        <p:nvSpPr>
+          <p:cNvPr id="13" name="TextBox 12">
+            <a:extLst>
+              <a:ext uri="{FF2B5EF4-FFF2-40B4-BE49-F238E27FC236}">
+                <a16:creationId xmlns:a16="http://schemas.microsoft.com/office/drawing/2014/main" id="{853145E0-382C-887A-9444-68B889CA5382}"/>
+              </a:ext>
+            </a:extLst>
+          </p:cNvPr>
+          <p:cNvSpPr txBox="1"/>
+          <p:nvPr/>
+        </p:nvSpPr>
+        <p:spPr>
+          <a:xfrm>
+            <a:off x="1778000" y="517132"/>
+            <a:ext cx="6096000" cy="369332"/>
+          </a:xfrm>
+          <a:prstGeom prst="rect">
+            <a:avLst/>
+          </a:prstGeom>
+          <a:noFill/>
+        </p:spPr>
+        <p:txBody>
+          <a:bodyPr wrap="square">
+            <a:spAutoFit/>
+          </a:bodyPr>
+          <a:lstStyle/>
+          <a:p>
+            <a:r>
+              <a:rPr lang="en-US" b="1" dirty="0">
+                <a:latin typeface="+mj-lt"/>
+              </a:rPr>
+              <a:t>Miscellaneous</a:t>
+            </a:r>
+          </a:p>
+        </p:txBody>
+      </p:sp>
+      <p:pic>
+        <p:nvPicPr>
+          <p:cNvPr id="4" name="Imagem 3">
+            <a:extLst>
+              <a:ext uri="{FF2B5EF4-FFF2-40B4-BE49-F238E27FC236}">
+                <a16:creationId xmlns:a16="http://schemas.microsoft.com/office/drawing/2014/main" id="{2EAC0D97-6AB5-15A2-8C4A-BDABBC073153}"/>
+              </a:ext>
+            </a:extLst>
+          </p:cNvPr>
+          <p:cNvPicPr>
+            <a:picLocks noChangeAspect="1"/>
+          </p:cNvPicPr>
+          <p:nvPr/>
+        </p:nvPicPr>
+        <p:blipFill>
+          <a:blip r:embed="rId2"/>
+          <a:stretch>
+            <a:fillRect/>
+          </a:stretch>
+        </p:blipFill>
+        <p:spPr>
+          <a:xfrm>
+            <a:off x="1041948" y="2993464"/>
+            <a:ext cx="4662815" cy="1522551"/>
+          </a:xfrm>
+          <a:prstGeom prst="rect">
+            <a:avLst/>
+          </a:prstGeom>
+        </p:spPr>
+      </p:pic>
+      <p:pic>
+        <p:nvPicPr>
+          <p:cNvPr id="8" name="Imagem 7">
+            <a:extLst>
+              <a:ext uri="{FF2B5EF4-FFF2-40B4-BE49-F238E27FC236}">
+                <a16:creationId xmlns:a16="http://schemas.microsoft.com/office/drawing/2014/main" id="{D22461F8-795F-E6A9-FB7A-EF469E4FB619}"/>
+              </a:ext>
+            </a:extLst>
+          </p:cNvPr>
+          <p:cNvPicPr>
+            <a:picLocks noChangeAspect="1"/>
+          </p:cNvPicPr>
+          <p:nvPr/>
+        </p:nvPicPr>
+        <p:blipFill>
+          <a:blip r:embed="rId3"/>
+          <a:stretch>
+            <a:fillRect/>
+          </a:stretch>
+        </p:blipFill>
+        <p:spPr>
+          <a:xfrm>
+            <a:off x="6743703" y="2227626"/>
+            <a:ext cx="4662815" cy="3348465"/>
+          </a:xfrm>
+          <a:prstGeom prst="rect">
+            <a:avLst/>
+          </a:prstGeom>
+        </p:spPr>
+      </p:pic>
+    </p:spTree>
+    <p:extLst>
+      <p:ext uri="{BB962C8B-B14F-4D97-AF65-F5344CB8AC3E}">
+        <p14:creationId xmlns:p14="http://schemas.microsoft.com/office/powerpoint/2010/main" val="3113280205"/>
+      </p:ext>
+    </p:extLst>
+  </p:cSld>
+  <p:clrMapOvr>
+    <a:masterClrMapping/>
+  </p:clrMapOvr>
+</p:sld>
+</file>
+
+<file path=ppt/slides/slide12.xml><?xml version="1.0" encoding="utf-8"?>
+<p:sld xmlns:a="http://schemas.openxmlformats.org/drawingml/2006/main" xmlns:r="http://schemas.openxmlformats.org/officeDocument/2006/relationships" xmlns:p="http://schemas.openxmlformats.org/presentationml/2006/main">
+  <p:cSld>
+    <p:spTree>
+      <p:nvGrpSpPr>
+        <p:cNvPr id="1" name=""/>
+        <p:cNvGrpSpPr/>
+        <p:nvPr/>
+      </p:nvGrpSpPr>
+      <p:grpSpPr>
+        <a:xfrm>
+          <a:off x="0" y="0"/>
+          <a:ext cx="0" cy="0"/>
+          <a:chOff x="0" y="0"/>
+          <a:chExt cx="0" cy="0"/>
+        </a:xfrm>
+      </p:grpSpPr>
+      <p:sp>
+        <p:nvSpPr>
+          <p:cNvPr id="2" name="Title 1">
+            <a:extLst>
+              <a:ext uri="{FF2B5EF4-FFF2-40B4-BE49-F238E27FC236}">
+                <a16:creationId xmlns:a16="http://schemas.microsoft.com/office/drawing/2014/main" id="{8BDF1EDE-5423-435C-B149-87AB1BC22B83}"/>
+              </a:ext>
+            </a:extLst>
+          </p:cNvPr>
+          <p:cNvSpPr>
+            <a:spLocks noGrp="1"/>
+          </p:cNvSpPr>
+          <p:nvPr>
+            <p:ph type="ctrTitle"/>
+          </p:nvPr>
+        </p:nvSpPr>
+        <p:spPr>
+          <a:xfrm>
+            <a:off x="4267200" y="1615736"/>
+            <a:ext cx="4179570" cy="1524735"/>
+          </a:xfrm>
+        </p:spPr>
+        <p:txBody>
+          <a:bodyPr/>
+          <a:lstStyle/>
+          <a:p>
+            <a:r>
+              <a:rPr lang="en-US" dirty="0"/>
+              <a:t>THANK YOU</a:t>
+            </a:r>
+          </a:p>
+        </p:txBody>
+      </p:sp>
+      <p:sp>
+        <p:nvSpPr>
+          <p:cNvPr id="3" name="Subtitle 2">
+            <a:extLst>
+              <a:ext uri="{FF2B5EF4-FFF2-40B4-BE49-F238E27FC236}">
+                <a16:creationId xmlns:a16="http://schemas.microsoft.com/office/drawing/2014/main" id="{AF64C29E-DF30-4DC6-AB95-2016F9A703B6}"/>
+              </a:ext>
+            </a:extLst>
+          </p:cNvPr>
+          <p:cNvSpPr>
+            <a:spLocks noGrp="1"/>
+          </p:cNvSpPr>
+          <p:nvPr>
+            <p:ph type="subTitle" idx="1"/>
+          </p:nvPr>
+        </p:nvSpPr>
+        <p:spPr>
+          <a:xfrm>
+            <a:off x="4267199" y="3238103"/>
+            <a:ext cx="5155933" cy="2850181"/>
+          </a:xfrm>
+        </p:spPr>
+        <p:txBody>
+          <a:bodyPr>
+            <a:noAutofit/>
+          </a:bodyPr>
+          <a:lstStyle/>
+          <a:p>
+            <a:r>
+              <a:rPr lang="en-US" dirty="0">
+                <a:latin typeface="+mj-lt"/>
+              </a:rPr>
+              <a:t>Joao Filipe de Carvalho Ferreira</a:t>
+            </a:r>
+            <a:br>
+              <a:rPr lang="en-US" dirty="0">
+                <a:latin typeface="+mj-lt"/>
+              </a:rPr>
+            </a:br>
+            <a:r>
+              <a:rPr lang="en-US" dirty="0">
+                <a:latin typeface="+mj-lt"/>
+              </a:rPr>
+              <a:t>Erik </a:t>
+            </a:r>
+            <a:r>
+              <a:rPr lang="en-US" dirty="0" err="1">
+                <a:latin typeface="+mj-lt"/>
+              </a:rPr>
+              <a:t>Milsencik</a:t>
+            </a:r>
+            <a:br>
+              <a:rPr lang="en-US" dirty="0">
+                <a:latin typeface="+mj-lt"/>
+              </a:rPr>
+            </a:br>
+            <a:r>
+              <a:rPr lang="en-US" dirty="0">
+                <a:latin typeface="+mj-lt"/>
+              </a:rPr>
+              <a:t>Tobias Schwarz</a:t>
+            </a:r>
+            <a:br>
+              <a:rPr lang="en-US" dirty="0">
+                <a:latin typeface="+mj-lt"/>
+              </a:rPr>
+            </a:br>
+            <a:r>
+              <a:rPr lang="en-US" dirty="0">
+                <a:latin typeface="+mj-lt"/>
+              </a:rPr>
+              <a:t>Ana Marta Martins dos Santos Dias Torres</a:t>
+            </a:r>
+          </a:p>
+        </p:txBody>
+      </p:sp>
+      <p:sp>
+        <p:nvSpPr>
+          <p:cNvPr id="6" name="Slide Number Placeholder 5">
+            <a:extLst>
+              <a:ext uri="{FF2B5EF4-FFF2-40B4-BE49-F238E27FC236}">
+                <a16:creationId xmlns:a16="http://schemas.microsoft.com/office/drawing/2014/main" id="{4C127D99-645F-4FCF-9573-FDFE2A344FA9}"/>
+              </a:ext>
+            </a:extLst>
+          </p:cNvPr>
+          <p:cNvSpPr>
+            <a:spLocks noGrp="1"/>
+          </p:cNvSpPr>
+          <p:nvPr>
+            <p:ph type="sldNum" sz="quarter" idx="12"/>
+          </p:nvPr>
+        </p:nvSpPr>
+        <p:spPr>
+          <a:xfrm>
+            <a:off x="9579428" y="6356350"/>
+            <a:ext cx="1774371" cy="365125"/>
+          </a:xfrm>
+        </p:spPr>
+        <p:txBody>
+          <a:bodyPr/>
+          <a:lstStyle/>
+          <a:p>
+            <a:fld id="{A49DFD55-3C28-40EF-9E31-A92D2E4017FF}" type="slidenum">
+              <a:rPr lang="en-US" smtClean="0"/>
+              <a:pPr/>
+              <a:t>12</a:t>
+            </a:fld>
+            <a:endParaRPr lang="en-US" dirty="0"/>
+          </a:p>
+        </p:txBody>
+      </p:sp>
+    </p:spTree>
+    <p:extLst>
+      <p:ext uri="{BB962C8B-B14F-4D97-AF65-F5344CB8AC3E}">
+        <p14:creationId xmlns:p14="http://schemas.microsoft.com/office/powerpoint/2010/main" val="1969787568"/>
+      </p:ext>
+    </p:extLst>
+  </p:cSld>
+  <p:clrMapOvr>
+    <a:masterClrMapping/>
+  </p:clrMapOvr>
+</p:sld>
+</file>
+
+<file path=ppt/slides/slide2.xml><?xml version="1.0" encoding="utf-8"?>
+<p:sld xmlns:a="http://schemas.openxmlformats.org/drawingml/2006/main" xmlns:r="http://schemas.openxmlformats.org/officeDocument/2006/relationships" xmlns:p="http://schemas.openxmlformats.org/presentationml/2006/main">
+  <p:cSld>
+    <p:spTree>
+      <p:nvGrpSpPr>
+        <p:cNvPr id="1" name=""/>
+        <p:cNvGrpSpPr/>
+        <p:nvPr/>
+      </p:nvGrpSpPr>
+      <p:grpSpPr>
+        <a:xfrm>
+          <a:off x="0" y="0"/>
+          <a:ext cx="0" cy="0"/>
+          <a:chOff x="0" y="0"/>
+          <a:chExt cx="0" cy="0"/>
+        </a:xfrm>
+      </p:grpSpPr>
+      <p:sp>
+        <p:nvSpPr>
+          <p:cNvPr id="2" name="Title 1">
+            <a:extLst>
+              <a:ext uri="{FF2B5EF4-FFF2-40B4-BE49-F238E27FC236}">
+                <a16:creationId xmlns:a16="http://schemas.microsoft.com/office/drawing/2014/main" id="{1BEF5859-10C9-4588-9727-B9362E26C29D}"/>
+              </a:ext>
+            </a:extLst>
+          </p:cNvPr>
+          <p:cNvSpPr>
+            <a:spLocks noGrp="1"/>
+          </p:cNvSpPr>
+          <p:nvPr>
+            <p:ph type="title"/>
+          </p:nvPr>
+        </p:nvSpPr>
+        <p:spPr>
+          <a:xfrm>
+            <a:off x="553853" y="1020445"/>
+            <a:ext cx="3796766" cy="1325563"/>
+          </a:xfrm>
+        </p:spPr>
+        <p:txBody>
+          <a:bodyPr/>
+          <a:lstStyle/>
+          <a:p>
+            <a:r>
+              <a:rPr lang="en-US" dirty="0"/>
+              <a:t>AGENDA</a:t>
+            </a:r>
+          </a:p>
+        </p:txBody>
+      </p:sp>
+      <p:sp>
+        <p:nvSpPr>
+          <p:cNvPr id="3" name="Content Placeholder 2">
+            <a:extLst>
+              <a:ext uri="{FF2B5EF4-FFF2-40B4-BE49-F238E27FC236}">
+                <a16:creationId xmlns:a16="http://schemas.microsoft.com/office/drawing/2014/main" id="{5671D7E5-EF66-4BCD-8DAA-E9061157F0BE}"/>
+              </a:ext>
+            </a:extLst>
+          </p:cNvPr>
+          <p:cNvSpPr>
+            <a:spLocks noGrp="1"/>
+          </p:cNvSpPr>
+          <p:nvPr>
+            <p:ph idx="1"/>
+          </p:nvPr>
+        </p:nvSpPr>
+        <p:spPr>
+          <a:xfrm>
+            <a:off x="553853" y="2674013"/>
+            <a:ext cx="3796766" cy="3269589"/>
+          </a:xfrm>
+        </p:spPr>
+        <p:txBody>
+          <a:bodyPr>
+            <a:normAutofit/>
+          </a:bodyPr>
+          <a:lstStyle/>
+          <a:p>
+            <a:r>
+              <a:rPr lang="en-US" dirty="0"/>
+              <a:t>Basic functions and operations</a:t>
+            </a:r>
+          </a:p>
+          <a:p>
+            <a:r>
+              <a:rPr lang="en-US" dirty="0"/>
+              <a:t>Use of structs</a:t>
+            </a:r>
+          </a:p>
+          <a:p>
+            <a:r>
+              <a:rPr lang="en-US" dirty="0"/>
+              <a:t>REPL</a:t>
+            </a:r>
+          </a:p>
+          <a:p>
+            <a:r>
+              <a:rPr lang="en-US" dirty="0"/>
+              <a:t>Reflection</a:t>
+            </a:r>
+          </a:p>
+          <a:p>
+            <a:r>
+              <a:rPr lang="en-US" dirty="0"/>
+              <a:t>Metaprogramming</a:t>
+            </a:r>
+          </a:p>
+          <a:p>
+            <a:r>
+              <a:rPr lang="en-US" dirty="0"/>
+              <a:t>Auxiliary Functions</a:t>
+            </a:r>
+          </a:p>
+        </p:txBody>
+      </p:sp>
+      <p:sp>
+        <p:nvSpPr>
+          <p:cNvPr id="5" name="Slide Number Placeholder 5">
+            <a:extLst>
+              <a:ext uri="{FF2B5EF4-FFF2-40B4-BE49-F238E27FC236}">
+                <a16:creationId xmlns:a16="http://schemas.microsoft.com/office/drawing/2014/main" id="{B02A8827-B1A1-2D2F-D6DD-E886B886C43E}"/>
+              </a:ext>
+            </a:extLst>
+          </p:cNvPr>
+          <p:cNvSpPr>
+            <a:spLocks noGrp="1"/>
+          </p:cNvSpPr>
+          <p:nvPr>
+            <p:ph type="sldNum" sz="quarter" idx="12"/>
+          </p:nvPr>
+        </p:nvSpPr>
+        <p:spPr>
+          <a:xfrm>
+            <a:off x="10373350" y="6356349"/>
+            <a:ext cx="987552" cy="365125"/>
+          </a:xfrm>
+        </p:spPr>
+        <p:txBody>
+          <a:bodyPr/>
+          <a:lstStyle/>
+          <a:p>
+            <a:fld id="{A49DFD55-3C28-40EF-9E31-A92D2E4017FF}" type="slidenum">
+              <a:rPr lang="en-US" smtClean="0"/>
+              <a:pPr/>
+              <a:t>2</a:t>
+            </a:fld>
+            <a:endParaRPr lang="en-US" dirty="0"/>
+          </a:p>
+        </p:txBody>
+      </p:sp>
+    </p:spTree>
+    <p:extLst>
+      <p:ext uri="{BB962C8B-B14F-4D97-AF65-F5344CB8AC3E}">
+        <p14:creationId xmlns:p14="http://schemas.microsoft.com/office/powerpoint/2010/main" val="1713219598"/>
+      </p:ext>
+    </p:extLst>
+  </p:cSld>
+  <p:clrMapOvr>
+    <a:masterClrMapping/>
+  </p:clrMapOvr>
+</p:sld>
+</file>
+
+<file path=ppt/slides/slide3.xml><?xml version="1.0" encoding="utf-8"?>
+<p:sld xmlns:a="http://schemas.openxmlformats.org/drawingml/2006/main" xmlns:r="http://schemas.openxmlformats.org/officeDocument/2006/relationships" xmlns:p="http://schemas.openxmlformats.org/presentationml/2006/main">
+  <p:cSld>
+    <p:spTree>
+      <p:nvGrpSpPr>
+        <p:cNvPr id="1" name=""/>
+        <p:cNvGrpSpPr/>
+        <p:nvPr/>
+      </p:nvGrpSpPr>
+      <p:grpSpPr>
+        <a:xfrm>
+          <a:off x="0" y="0"/>
+          <a:ext cx="0" cy="0"/>
+          <a:chOff x="0" y="0"/>
+          <a:chExt cx="0" cy="0"/>
+        </a:xfrm>
+      </p:grpSpPr>
+      <p:sp>
+        <p:nvSpPr>
+          <p:cNvPr id="5" name="Slide Number Placeholder 4">
+            <a:extLst>
+              <a:ext uri="{FF2B5EF4-FFF2-40B4-BE49-F238E27FC236}">
+                <a16:creationId xmlns:a16="http://schemas.microsoft.com/office/drawing/2014/main" id="{78138769-92F5-4A6E-6BE7-4DD65A86294D}"/>
+              </a:ext>
+            </a:extLst>
+          </p:cNvPr>
+          <p:cNvSpPr>
+            <a:spLocks noGrp="1"/>
+          </p:cNvSpPr>
+          <p:nvPr>
+            <p:ph type="sldNum" sz="quarter" idx="12"/>
+          </p:nvPr>
+        </p:nvSpPr>
+        <p:spPr/>
+        <p:txBody>
+          <a:bodyPr/>
+          <a:lstStyle/>
+          <a:p>
+            <a:fld id="{A49DFD55-3C28-40EF-9E31-A92D2E4017FF}" type="slidenum">
+              <a:rPr lang="en-US" smtClean="0"/>
+              <a:pPr/>
+              <a:t>3</a:t>
+            </a:fld>
+            <a:endParaRPr lang="en-US" dirty="0"/>
+          </a:p>
+        </p:txBody>
+      </p:sp>
+      <p:pic>
+        <p:nvPicPr>
+          <p:cNvPr id="7" name="Picture 6">
+            <a:extLst>
+              <a:ext uri="{FF2B5EF4-FFF2-40B4-BE49-F238E27FC236}">
+                <a16:creationId xmlns:a16="http://schemas.microsoft.com/office/drawing/2014/main" id="{638EF26F-D880-E5CD-7A5D-C08F42F4CF90}"/>
+              </a:ext>
+            </a:extLst>
+          </p:cNvPr>
+          <p:cNvPicPr>
+            <a:picLocks noChangeAspect="1"/>
+          </p:cNvPicPr>
+          <p:nvPr/>
+        </p:nvPicPr>
+        <p:blipFill>
+          <a:blip r:embed="rId2"/>
+          <a:stretch>
+            <a:fillRect/>
+          </a:stretch>
+        </p:blipFill>
+        <p:spPr>
+          <a:xfrm>
+            <a:off x="1778000" y="2849095"/>
+            <a:ext cx="7498446" cy="1661945"/>
+          </a:xfrm>
+          <a:prstGeom prst="rect">
+            <a:avLst/>
+          </a:prstGeom>
+        </p:spPr>
+      </p:pic>
+      <p:pic>
+        <p:nvPicPr>
+          <p:cNvPr id="9" name="Picture 8">
+            <a:extLst>
+              <a:ext uri="{FF2B5EF4-FFF2-40B4-BE49-F238E27FC236}">
+                <a16:creationId xmlns:a16="http://schemas.microsoft.com/office/drawing/2014/main" id="{3AF308F6-1A87-BA62-5EE7-92D361F9600C}"/>
+              </a:ext>
+            </a:extLst>
+          </p:cNvPr>
+          <p:cNvPicPr>
+            <a:picLocks noChangeAspect="1"/>
+          </p:cNvPicPr>
+          <p:nvPr/>
+        </p:nvPicPr>
+        <p:blipFill>
+          <a:blip r:embed="rId3"/>
+          <a:stretch>
+            <a:fillRect/>
+          </a:stretch>
+        </p:blipFill>
+        <p:spPr>
+          <a:xfrm>
+            <a:off x="1778000" y="4768802"/>
+            <a:ext cx="7376160" cy="1189957"/>
+          </a:xfrm>
+          <a:prstGeom prst="rect">
+            <a:avLst/>
+          </a:prstGeom>
+        </p:spPr>
+      </p:pic>
+      <p:sp>
+        <p:nvSpPr>
+          <p:cNvPr id="11" name="TextBox 10">
+            <a:extLst>
+              <a:ext uri="{FF2B5EF4-FFF2-40B4-BE49-F238E27FC236}">
+                <a16:creationId xmlns:a16="http://schemas.microsoft.com/office/drawing/2014/main" id="{9C50F531-062B-30A8-0EFA-1828B8452648}"/>
+              </a:ext>
+            </a:extLst>
+          </p:cNvPr>
+          <p:cNvSpPr txBox="1"/>
+          <p:nvPr/>
+        </p:nvSpPr>
+        <p:spPr>
+          <a:xfrm>
+            <a:off x="1778000" y="1114005"/>
+            <a:ext cx="6096000" cy="1477328"/>
+          </a:xfrm>
+          <a:prstGeom prst="rect">
+            <a:avLst/>
+          </a:prstGeom>
+          <a:noFill/>
+        </p:spPr>
+        <p:txBody>
+          <a:bodyPr wrap="square">
+            <a:spAutoFit/>
+          </a:bodyPr>
+          <a:lstStyle/>
+          <a:p>
+            <a:r>
+              <a:rPr lang="en-US" dirty="0"/>
+              <a:t>We separated the most basic calls in other files. So, a </a:t>
+            </a:r>
+            <a:r>
+              <a:rPr lang="en-US" dirty="0" err="1"/>
+              <a:t>dict</a:t>
+            </a:r>
+            <a:r>
+              <a:rPr lang="en-US" dirty="0"/>
+              <a:t> defines for basic operations which action should be performed. </a:t>
+            </a:r>
+          </a:p>
+          <a:p>
+            <a:endParaRPr lang="en-US" dirty="0"/>
+          </a:p>
+          <a:p>
+            <a:r>
+              <a:rPr lang="en-US" dirty="0"/>
+              <a:t>This leads to a clean design and better maintainability.</a:t>
+            </a:r>
+          </a:p>
+        </p:txBody>
+      </p:sp>
+      <p:sp>
+        <p:nvSpPr>
+          <p:cNvPr id="13" name="TextBox 12">
+            <a:extLst>
+              <a:ext uri="{FF2B5EF4-FFF2-40B4-BE49-F238E27FC236}">
+                <a16:creationId xmlns:a16="http://schemas.microsoft.com/office/drawing/2014/main" id="{853145E0-382C-887A-9444-68B889CA5382}"/>
+              </a:ext>
+            </a:extLst>
+          </p:cNvPr>
+          <p:cNvSpPr txBox="1"/>
+          <p:nvPr/>
+        </p:nvSpPr>
+        <p:spPr>
+          <a:xfrm>
+            <a:off x="1778000" y="517132"/>
+            <a:ext cx="6096000" cy="369332"/>
+          </a:xfrm>
+          <a:prstGeom prst="rect">
+            <a:avLst/>
+          </a:prstGeom>
+          <a:noFill/>
+        </p:spPr>
+        <p:txBody>
+          <a:bodyPr wrap="square">
+            <a:spAutoFit/>
+          </a:bodyPr>
+          <a:lstStyle/>
+          <a:p>
+            <a:r>
+              <a:rPr lang="en-US" b="1" dirty="0">
+                <a:latin typeface="+mj-lt"/>
+              </a:rPr>
+              <a:t>Basic functions and operations</a:t>
+            </a:r>
+          </a:p>
+        </p:txBody>
+      </p:sp>
+    </p:spTree>
+    <p:extLst>
+      <p:ext uri="{BB962C8B-B14F-4D97-AF65-F5344CB8AC3E}">
+        <p14:creationId xmlns:p14="http://schemas.microsoft.com/office/powerpoint/2010/main" val="2827551494"/>
+      </p:ext>
+    </p:extLst>
+  </p:cSld>
+  <p:clrMapOvr>
+    <a:masterClrMapping/>
+  </p:clrMapOvr>
+</p:sld>
+</file>
+
+<file path=ppt/slides/slide4.xml><?xml version="1.0" encoding="utf-8"?>
+<p:sld xmlns:a="http://schemas.openxmlformats.org/drawingml/2006/main" xmlns:r="http://schemas.openxmlformats.org/officeDocument/2006/relationships" xmlns:p="http://schemas.openxmlformats.org/presentationml/2006/main">
+  <p:cSld>
+    <p:spTree>
+      <p:nvGrpSpPr>
+        <p:cNvPr id="1" name=""/>
+        <p:cNvGrpSpPr/>
+        <p:nvPr/>
+      </p:nvGrpSpPr>
+      <p:grpSpPr>
+        <a:xfrm>
+          <a:off x="0" y="0"/>
+          <a:ext cx="0" cy="0"/>
+          <a:chOff x="0" y="0"/>
+          <a:chExt cx="0" cy="0"/>
+        </a:xfrm>
+      </p:grpSpPr>
+      <p:sp>
+        <p:nvSpPr>
+          <p:cNvPr id="7" name="Slide Number Placeholder 6">
+            <a:extLst>
+              <a:ext uri="{FF2B5EF4-FFF2-40B4-BE49-F238E27FC236}">
+                <a16:creationId xmlns:a16="http://schemas.microsoft.com/office/drawing/2014/main" id="{C7497EBF-E1E3-4DB7-F260-98CBE82FDD65}"/>
+              </a:ext>
+            </a:extLst>
+          </p:cNvPr>
+          <p:cNvSpPr>
+            <a:spLocks noGrp="1"/>
+          </p:cNvSpPr>
+          <p:nvPr>
+            <p:ph type="sldNum" sz="quarter" idx="13"/>
+          </p:nvPr>
+        </p:nvSpPr>
+        <p:spPr/>
+        <p:txBody>
+          <a:bodyPr/>
+          <a:lstStyle/>
+          <a:p>
             <a:fld id="{A49DFD55-3C28-40EF-9E31-A92D2E4017FF}" type="slidenum">
               <a:rPr lang="en-US" smtClean="0"/>
               <a:pPr/>
               <a:t>4</a:t>
             </a:fld>
+            <a:endParaRPr lang="en-US" dirty="0"/>
+          </a:p>
+        </p:txBody>
+      </p:sp>
+      <p:sp>
+        <p:nvSpPr>
+          <p:cNvPr id="8" name="Slide Number Placeholder 4">
+            <a:extLst>
+              <a:ext uri="{FF2B5EF4-FFF2-40B4-BE49-F238E27FC236}">
+                <a16:creationId xmlns:a16="http://schemas.microsoft.com/office/drawing/2014/main" id="{B3FF5CD7-F7D9-45AD-9060-46A06F4EFA9F}"/>
+              </a:ext>
+            </a:extLst>
+          </p:cNvPr>
+          <p:cNvSpPr txBox="1">
+            <a:spLocks/>
+          </p:cNvSpPr>
+          <p:nvPr/>
+        </p:nvSpPr>
+        <p:spPr>
+          <a:xfrm>
+            <a:off x="10373350" y="6356349"/>
+            <a:ext cx="987552" cy="365125"/>
+          </a:xfrm>
+          <a:prstGeom prst="rect">
+            <a:avLst/>
+          </a:prstGeom>
+        </p:spPr>
+        <p:txBody>
+          <a:bodyPr vert="horz" lIns="91440" tIns="45720" rIns="91440" bIns="45720" rtlCol="0" anchor="ctr"/>
+          <a:lstStyle>
+            <a:defPPr>
+              <a:defRPr lang="en-US"/>
+            </a:defPPr>
+            <a:lvl1pPr marL="0" algn="l" defTabSz="914400" rtl="0" eaLnBrk="1" latinLnBrk="0" hangingPunct="1">
+              <a:defRPr sz="900" kern="1200">
+                <a:solidFill>
+                  <a:schemeClr val="tx1">
+                    <a:tint val="75000"/>
+                  </a:schemeClr>
+                </a:solidFill>
+                <a:latin typeface="+mn-lt"/>
+                <a:ea typeface="+mn-ea"/>
+                <a:cs typeface="+mn-cs"/>
+              </a:defRPr>
+            </a:lvl1pPr>
+            <a:lvl2pPr marL="457200" algn="l" defTabSz="914400" rtl="0" eaLnBrk="1" latinLnBrk="0" hangingPunct="1">
+              <a:defRPr sz="1800" kern="1200">
+                <a:solidFill>
+                  <a:schemeClr val="tx1"/>
+                </a:solidFill>
+                <a:latin typeface="+mn-lt"/>
+                <a:ea typeface="+mn-ea"/>
+                <a:cs typeface="+mn-cs"/>
+              </a:defRPr>
+            </a:lvl2pPr>
+            <a:lvl3pPr marL="914400" algn="l" defTabSz="914400" rtl="0" eaLnBrk="1" latinLnBrk="0" hangingPunct="1">
+              <a:defRPr sz="1800" kern="1200">
+                <a:solidFill>
+                  <a:schemeClr val="tx1"/>
+                </a:solidFill>
+                <a:latin typeface="+mn-lt"/>
+                <a:ea typeface="+mn-ea"/>
+                <a:cs typeface="+mn-cs"/>
+              </a:defRPr>
+            </a:lvl3pPr>
+            <a:lvl4pPr marL="1371600" algn="l" defTabSz="914400" rtl="0" eaLnBrk="1" latinLnBrk="0" hangingPunct="1">
+              <a:defRPr sz="1800" kern="1200">
+                <a:solidFill>
+                  <a:schemeClr val="tx1"/>
+                </a:solidFill>
+                <a:latin typeface="+mn-lt"/>
+                <a:ea typeface="+mn-ea"/>
+                <a:cs typeface="+mn-cs"/>
+              </a:defRPr>
+            </a:lvl4pPr>
+            <a:lvl5pPr marL="1828800" algn="l" defTabSz="914400" rtl="0" eaLnBrk="1" latinLnBrk="0" hangingPunct="1">
+              <a:defRPr sz="1800" kern="1200">
+                <a:solidFill>
+                  <a:schemeClr val="tx1"/>
+                </a:solidFill>
+                <a:latin typeface="+mn-lt"/>
+                <a:ea typeface="+mn-ea"/>
+                <a:cs typeface="+mn-cs"/>
+              </a:defRPr>
+            </a:lvl5pPr>
+            <a:lvl6pPr marL="2286000" algn="l" defTabSz="914400" rtl="0" eaLnBrk="1" latinLnBrk="0" hangingPunct="1">
+              <a:defRPr sz="1800" kern="1200">
+                <a:solidFill>
+                  <a:schemeClr val="tx1"/>
+                </a:solidFill>
+                <a:latin typeface="+mn-lt"/>
+                <a:ea typeface="+mn-ea"/>
+                <a:cs typeface="+mn-cs"/>
+              </a:defRPr>
+            </a:lvl6pPr>
+            <a:lvl7pPr marL="2743200" algn="l" defTabSz="914400" rtl="0" eaLnBrk="1" latinLnBrk="0" hangingPunct="1">
+              <a:defRPr sz="1800" kern="1200">
+                <a:solidFill>
+                  <a:schemeClr val="tx1"/>
+                </a:solidFill>
+                <a:latin typeface="+mn-lt"/>
+                <a:ea typeface="+mn-ea"/>
+                <a:cs typeface="+mn-cs"/>
+              </a:defRPr>
+            </a:lvl7pPr>
+            <a:lvl8pPr marL="3200400" algn="l" defTabSz="914400" rtl="0" eaLnBrk="1" latinLnBrk="0" hangingPunct="1">
+              <a:defRPr sz="1800" kern="1200">
+                <a:solidFill>
+                  <a:schemeClr val="tx1"/>
+                </a:solidFill>
+                <a:latin typeface="+mn-lt"/>
+                <a:ea typeface="+mn-ea"/>
+                <a:cs typeface="+mn-cs"/>
+              </a:defRPr>
+            </a:lvl8pPr>
+            <a:lvl9pPr marL="3657600" algn="l" defTabSz="914400" rtl="0" eaLnBrk="1" latinLnBrk="0" hangingPunct="1">
+              <a:defRPr sz="1800" kern="1200">
+                <a:solidFill>
+                  <a:schemeClr val="tx1"/>
+                </a:solidFill>
+                <a:latin typeface="+mn-lt"/>
+                <a:ea typeface="+mn-ea"/>
+                <a:cs typeface="+mn-cs"/>
+              </a:defRPr>
+            </a:lvl9pPr>
+          </a:lstStyle>
+          <a:p>
             <a:endParaRPr lang="en-US" dirty="0"/>
           </a:p>
         </p:txBody>
@@ -7754,7 +8474,7 @@
           <a:p>
             <a:r>
               <a:rPr lang="de-DE" dirty="0"/>
-              <a:t>REWL</a:t>
+              <a:t>REPL</a:t>
             </a:r>
             <a:endParaRPr lang="en-US" dirty="0"/>
           </a:p>
@@ -7864,95 +8584,7 @@
             <a:pPr algn="ctr"/>
             <a:r>
               <a:rPr lang="de-DE" dirty="0"/>
-              <a:t>Here you </a:t>
-            </a:r>
-            <a:r>
-              <a:rPr lang="de-DE" dirty="0" err="1"/>
-              <a:t>could</a:t>
-            </a:r>
-            <a:r>
-              <a:rPr lang="de-DE" dirty="0"/>
-              <a:t> </a:t>
-            </a:r>
-            <a:r>
-              <a:rPr lang="de-DE" dirty="0" err="1"/>
-              <a:t>say</a:t>
-            </a:r>
-            <a:r>
-              <a:rPr lang="de-DE" dirty="0"/>
-              <a:t> </a:t>
-            </a:r>
-            <a:r>
-              <a:rPr lang="de-DE" dirty="0" err="1"/>
-              <a:t>something</a:t>
-            </a:r>
-            <a:r>
-              <a:rPr lang="de-DE" dirty="0"/>
-              <a:t> </a:t>
-            </a:r>
-            <a:r>
-              <a:rPr lang="de-DE" dirty="0" err="1"/>
-              <a:t>about</a:t>
-            </a:r>
-            <a:r>
-              <a:rPr lang="de-DE" dirty="0"/>
-              <a:t> </a:t>
-            </a:r>
-            <a:r>
-              <a:rPr lang="de-DE" dirty="0" err="1"/>
-              <a:t>scoping</a:t>
-            </a:r>
-            <a:r>
-              <a:rPr lang="de-DE" dirty="0"/>
-              <a:t> </a:t>
-            </a:r>
-            <a:r>
-              <a:rPr lang="de-DE" dirty="0" err="1"/>
-              <a:t>anf</a:t>
-            </a:r>
-            <a:r>
-              <a:rPr lang="de-DE" dirty="0"/>
-              <a:t> </a:t>
-            </a:r>
-            <a:r>
-              <a:rPr lang="de-DE" dirty="0" err="1"/>
-              <a:t>why</a:t>
-            </a:r>
-            <a:r>
-              <a:rPr lang="de-DE" dirty="0"/>
-              <a:t> you </a:t>
-            </a:r>
-            <a:r>
-              <a:rPr lang="de-DE" dirty="0" err="1"/>
-              <a:t>choosed</a:t>
-            </a:r>
-            <a:r>
-              <a:rPr lang="de-DE" dirty="0"/>
-              <a:t> </a:t>
-            </a:r>
-            <a:r>
-              <a:rPr lang="de-DE" dirty="0" err="1"/>
-              <a:t>thos</a:t>
-            </a:r>
-            <a:r>
-              <a:rPr lang="de-DE" dirty="0"/>
-              <a:t> </a:t>
-            </a:r>
-            <a:r>
-              <a:rPr lang="de-DE" dirty="0" err="1"/>
-              <a:t>params</a:t>
-            </a:r>
-            <a:r>
-              <a:rPr lang="de-DE" dirty="0"/>
-              <a:t> </a:t>
-            </a:r>
-            <a:r>
-              <a:rPr lang="de-DE" dirty="0" err="1"/>
-              <a:t>for</a:t>
-            </a:r>
-            <a:r>
-              <a:rPr lang="de-DE" dirty="0"/>
-              <a:t> parse</a:t>
+              <a:t>Here you could say something about scopping and why you chose those params for parse</a:t>
             </a:r>
             <a:endParaRPr lang="en-US" dirty="0"/>
           </a:p>
@@ -8010,8 +8642,8 @@
           <a:lstStyle/>
           <a:p>
             <a:r>
-              <a:rPr lang="de-DE" dirty="0" err="1"/>
-              <a:t>Refelction</a:t>
+              <a:rPr lang="de-DE" dirty="0"/>
+              <a:t>ReflEction</a:t>
             </a:r>
             <a:endParaRPr lang="en-US" dirty="0"/>
           </a:p>
@@ -8383,10 +9015,10 @@
       </p:grpSpPr>
       <p:sp>
         <p:nvSpPr>
-          <p:cNvPr id="2" name="Title 1">
-            <a:extLst>
-              <a:ext uri="{FF2B5EF4-FFF2-40B4-BE49-F238E27FC236}">
-                <a16:creationId xmlns:a16="http://schemas.microsoft.com/office/drawing/2014/main" id="{8BDF1EDE-5423-435C-B149-87AB1BC22B83}"/>
+          <p:cNvPr id="7" name="Slide Number Placeholder 6">
+            <a:extLst>
+              <a:ext uri="{FF2B5EF4-FFF2-40B4-BE49-F238E27FC236}">
+                <a16:creationId xmlns:a16="http://schemas.microsoft.com/office/drawing/2014/main" id="{C7497EBF-E1E3-4DB7-F260-98CBE82FDD65}"/>
               </a:ext>
             </a:extLst>
           </p:cNvPr>
@@ -8394,108 +9026,438 @@
             <a:spLocks noGrp="1"/>
           </p:cNvSpPr>
           <p:nvPr>
-            <p:ph type="ctrTitle"/>
+            <p:ph type="sldNum" sz="quarter" idx="13"/>
           </p:nvPr>
         </p:nvSpPr>
-        <p:spPr>
-          <a:xfrm>
-            <a:off x="4267200" y="1615736"/>
-            <a:ext cx="4179570" cy="1524735"/>
-          </a:xfrm>
-        </p:spPr>
+        <p:spPr/>
         <p:txBody>
           <a:bodyPr/>
           <a:lstStyle/>
           <a:p>
-            <a:r>
-              <a:rPr lang="en-US" dirty="0"/>
-              <a:t>THANK YOU</a:t>
-            </a:r>
-          </a:p>
-        </p:txBody>
-      </p:sp>
-      <p:sp>
-        <p:nvSpPr>
-          <p:cNvPr id="3" name="Subtitle 2">
-            <a:extLst>
-              <a:ext uri="{FF2B5EF4-FFF2-40B4-BE49-F238E27FC236}">
-                <a16:creationId xmlns:a16="http://schemas.microsoft.com/office/drawing/2014/main" id="{AF64C29E-DF30-4DC6-AB95-2016F9A703B6}"/>
-              </a:ext>
-            </a:extLst>
-          </p:cNvPr>
-          <p:cNvSpPr>
-            <a:spLocks noGrp="1"/>
+            <a:fld id="{A49DFD55-3C28-40EF-9E31-A92D2E4017FF}" type="slidenum">
+              <a:rPr lang="en-US" smtClean="0"/>
+              <a:pPr/>
+              <a:t>8</a:t>
+            </a:fld>
+            <a:endParaRPr lang="en-US" dirty="0"/>
+          </a:p>
+        </p:txBody>
+      </p:sp>
+      <p:sp>
+        <p:nvSpPr>
+          <p:cNvPr id="8" name="Slide Number Placeholder 4">
+            <a:extLst>
+              <a:ext uri="{FF2B5EF4-FFF2-40B4-BE49-F238E27FC236}">
+                <a16:creationId xmlns:a16="http://schemas.microsoft.com/office/drawing/2014/main" id="{B3FF5CD7-F7D9-45AD-9060-46A06F4EFA9F}"/>
+              </a:ext>
+            </a:extLst>
+          </p:cNvPr>
+          <p:cNvSpPr txBox="1">
+            <a:spLocks/>
           </p:cNvSpPr>
-          <p:nvPr>
-            <p:ph type="subTitle" idx="1"/>
-          </p:nvPr>
-        </p:nvSpPr>
-        <p:spPr>
-          <a:xfrm>
-            <a:off x="4267199" y="3238103"/>
-            <a:ext cx="5155933" cy="2850181"/>
-          </a:xfrm>
-        </p:spPr>
-        <p:txBody>
-          <a:bodyPr>
-            <a:noAutofit/>
+          <p:nvPr/>
+        </p:nvSpPr>
+        <p:spPr>
+          <a:xfrm>
+            <a:off x="10373350" y="6356349"/>
+            <a:ext cx="987552" cy="365125"/>
+          </a:xfrm>
+          <a:prstGeom prst="rect">
+            <a:avLst/>
+          </a:prstGeom>
+        </p:spPr>
+        <p:txBody>
+          <a:bodyPr vert="horz" lIns="91440" tIns="45720" rIns="91440" bIns="45720" rtlCol="0" anchor="ctr"/>
+          <a:lstStyle>
+            <a:defPPr>
+              <a:defRPr lang="en-US"/>
+            </a:defPPr>
+            <a:lvl1pPr marL="0" algn="l" defTabSz="914400" rtl="0" eaLnBrk="1" latinLnBrk="0" hangingPunct="1">
+              <a:defRPr sz="900" kern="1200">
+                <a:solidFill>
+                  <a:schemeClr val="tx1">
+                    <a:tint val="75000"/>
+                  </a:schemeClr>
+                </a:solidFill>
+                <a:latin typeface="+mn-lt"/>
+                <a:ea typeface="+mn-ea"/>
+                <a:cs typeface="+mn-cs"/>
+              </a:defRPr>
+            </a:lvl1pPr>
+            <a:lvl2pPr marL="457200" algn="l" defTabSz="914400" rtl="0" eaLnBrk="1" latinLnBrk="0" hangingPunct="1">
+              <a:defRPr sz="1800" kern="1200">
+                <a:solidFill>
+                  <a:schemeClr val="tx1"/>
+                </a:solidFill>
+                <a:latin typeface="+mn-lt"/>
+                <a:ea typeface="+mn-ea"/>
+                <a:cs typeface="+mn-cs"/>
+              </a:defRPr>
+            </a:lvl2pPr>
+            <a:lvl3pPr marL="914400" algn="l" defTabSz="914400" rtl="0" eaLnBrk="1" latinLnBrk="0" hangingPunct="1">
+              <a:defRPr sz="1800" kern="1200">
+                <a:solidFill>
+                  <a:schemeClr val="tx1"/>
+                </a:solidFill>
+                <a:latin typeface="+mn-lt"/>
+                <a:ea typeface="+mn-ea"/>
+                <a:cs typeface="+mn-cs"/>
+              </a:defRPr>
+            </a:lvl3pPr>
+            <a:lvl4pPr marL="1371600" algn="l" defTabSz="914400" rtl="0" eaLnBrk="1" latinLnBrk="0" hangingPunct="1">
+              <a:defRPr sz="1800" kern="1200">
+                <a:solidFill>
+                  <a:schemeClr val="tx1"/>
+                </a:solidFill>
+                <a:latin typeface="+mn-lt"/>
+                <a:ea typeface="+mn-ea"/>
+                <a:cs typeface="+mn-cs"/>
+              </a:defRPr>
+            </a:lvl4pPr>
+            <a:lvl5pPr marL="1828800" algn="l" defTabSz="914400" rtl="0" eaLnBrk="1" latinLnBrk="0" hangingPunct="1">
+              <a:defRPr sz="1800" kern="1200">
+                <a:solidFill>
+                  <a:schemeClr val="tx1"/>
+                </a:solidFill>
+                <a:latin typeface="+mn-lt"/>
+                <a:ea typeface="+mn-ea"/>
+                <a:cs typeface="+mn-cs"/>
+              </a:defRPr>
+            </a:lvl5pPr>
+            <a:lvl6pPr marL="2286000" algn="l" defTabSz="914400" rtl="0" eaLnBrk="1" latinLnBrk="0" hangingPunct="1">
+              <a:defRPr sz="1800" kern="1200">
+                <a:solidFill>
+                  <a:schemeClr val="tx1"/>
+                </a:solidFill>
+                <a:latin typeface="+mn-lt"/>
+                <a:ea typeface="+mn-ea"/>
+                <a:cs typeface="+mn-cs"/>
+              </a:defRPr>
+            </a:lvl6pPr>
+            <a:lvl7pPr marL="2743200" algn="l" defTabSz="914400" rtl="0" eaLnBrk="1" latinLnBrk="0" hangingPunct="1">
+              <a:defRPr sz="1800" kern="1200">
+                <a:solidFill>
+                  <a:schemeClr val="tx1"/>
+                </a:solidFill>
+                <a:latin typeface="+mn-lt"/>
+                <a:ea typeface="+mn-ea"/>
+                <a:cs typeface="+mn-cs"/>
+              </a:defRPr>
+            </a:lvl7pPr>
+            <a:lvl8pPr marL="3200400" algn="l" defTabSz="914400" rtl="0" eaLnBrk="1" latinLnBrk="0" hangingPunct="1">
+              <a:defRPr sz="1800" kern="1200">
+                <a:solidFill>
+                  <a:schemeClr val="tx1"/>
+                </a:solidFill>
+                <a:latin typeface="+mn-lt"/>
+                <a:ea typeface="+mn-ea"/>
+                <a:cs typeface="+mn-cs"/>
+              </a:defRPr>
+            </a:lvl8pPr>
+            <a:lvl9pPr marL="3657600" algn="l" defTabSz="914400" rtl="0" eaLnBrk="1" latinLnBrk="0" hangingPunct="1">
+              <a:defRPr sz="1800" kern="1200">
+                <a:solidFill>
+                  <a:schemeClr val="tx1"/>
+                </a:solidFill>
+                <a:latin typeface="+mn-lt"/>
+                <a:ea typeface="+mn-ea"/>
+                <a:cs typeface="+mn-cs"/>
+              </a:defRPr>
+            </a:lvl9pPr>
+          </a:lstStyle>
+          <a:p>
+            <a:endParaRPr lang="en-US" dirty="0"/>
+          </a:p>
+        </p:txBody>
+      </p:sp>
+      <p:sp>
+        <p:nvSpPr>
+          <p:cNvPr id="11" name="TextBox 10">
+            <a:extLst>
+              <a:ext uri="{FF2B5EF4-FFF2-40B4-BE49-F238E27FC236}">
+                <a16:creationId xmlns:a16="http://schemas.microsoft.com/office/drawing/2014/main" id="{0C5D619A-C374-B2F8-3F2A-35CA1A45FA66}"/>
+              </a:ext>
+            </a:extLst>
+          </p:cNvPr>
+          <p:cNvSpPr txBox="1"/>
+          <p:nvPr/>
+        </p:nvSpPr>
+        <p:spPr>
+          <a:xfrm>
+            <a:off x="1778000" y="1114005"/>
+            <a:ext cx="6096000" cy="646331"/>
+          </a:xfrm>
+          <a:prstGeom prst="rect">
+            <a:avLst/>
+          </a:prstGeom>
+          <a:noFill/>
+        </p:spPr>
+        <p:txBody>
+          <a:bodyPr wrap="square">
+            <a:spAutoFit/>
           </a:bodyPr>
           <a:lstStyle/>
           <a:p>
             <a:r>
-              <a:rPr lang="en-US" dirty="0">
+              <a:rPr lang="en-US" dirty="0"/>
+              <a:t>For better a better comprehension and to avoid code duplication, we created various check functions</a:t>
+            </a:r>
+          </a:p>
+        </p:txBody>
+      </p:sp>
+      <p:sp>
+        <p:nvSpPr>
+          <p:cNvPr id="12" name="TextBox 11">
+            <a:extLst>
+              <a:ext uri="{FF2B5EF4-FFF2-40B4-BE49-F238E27FC236}">
+                <a16:creationId xmlns:a16="http://schemas.microsoft.com/office/drawing/2014/main" id="{28689290-2634-4BDD-5E37-ECA5D4DD45A9}"/>
+              </a:ext>
+            </a:extLst>
+          </p:cNvPr>
+          <p:cNvSpPr txBox="1"/>
+          <p:nvPr/>
+        </p:nvSpPr>
+        <p:spPr>
+          <a:xfrm>
+            <a:off x="1778000" y="517132"/>
+            <a:ext cx="6096000" cy="369332"/>
+          </a:xfrm>
+          <a:prstGeom prst="rect">
+            <a:avLst/>
+          </a:prstGeom>
+          <a:noFill/>
+        </p:spPr>
+        <p:txBody>
+          <a:bodyPr wrap="square">
+            <a:spAutoFit/>
+          </a:bodyPr>
+          <a:lstStyle/>
+          <a:p>
+            <a:r>
+              <a:rPr lang="en-US" b="1" dirty="0">
                 <a:latin typeface="+mj-lt"/>
               </a:rPr>
-              <a:t>Joao Filipe de Carvalho Ferreira</a:t>
-            </a:r>
-            <a:br>
-              <a:rPr lang="en-US" dirty="0">
-                <a:latin typeface="+mj-lt"/>
-              </a:rPr>
-            </a:br>
-            <a:r>
-              <a:rPr lang="en-US" dirty="0">
-                <a:latin typeface="+mj-lt"/>
-              </a:rPr>
-              <a:t>Erik </a:t>
-            </a:r>
-            <a:r>
-              <a:rPr lang="en-US" dirty="0" err="1">
-                <a:latin typeface="+mj-lt"/>
-              </a:rPr>
-              <a:t>Milsencik</a:t>
-            </a:r>
-            <a:br>
-              <a:rPr lang="en-US" dirty="0">
-                <a:latin typeface="+mj-lt"/>
-              </a:rPr>
-            </a:br>
-            <a:r>
-              <a:rPr lang="en-US" dirty="0">
-                <a:latin typeface="+mj-lt"/>
-              </a:rPr>
-              <a:t>Tobias Schwarz</a:t>
-            </a:r>
-            <a:br>
-              <a:rPr lang="en-US" dirty="0">
-                <a:latin typeface="+mj-lt"/>
-              </a:rPr>
-            </a:br>
-            <a:r>
-              <a:rPr lang="en-US" dirty="0">
-                <a:latin typeface="+mj-lt"/>
-              </a:rPr>
-              <a:t>Ana Marta Martins dos Santos Dias Torres</a:t>
-            </a:r>
-          </a:p>
-        </p:txBody>
-      </p:sp>
-      <p:sp>
-        <p:nvSpPr>
-          <p:cNvPr id="6" name="Slide Number Placeholder 5">
-            <a:extLst>
-              <a:ext uri="{FF2B5EF4-FFF2-40B4-BE49-F238E27FC236}">
-                <a16:creationId xmlns:a16="http://schemas.microsoft.com/office/drawing/2014/main" id="{4C127D99-645F-4FCF-9573-FDFE2A344FA9}"/>
+              <a:t>Use of check functions</a:t>
+            </a:r>
+          </a:p>
+        </p:txBody>
+      </p:sp>
+      <p:pic>
+        <p:nvPicPr>
+          <p:cNvPr id="5" name="Imagem 4">
+            <a:extLst>
+              <a:ext uri="{FF2B5EF4-FFF2-40B4-BE49-F238E27FC236}">
+                <a16:creationId xmlns:a16="http://schemas.microsoft.com/office/drawing/2014/main" id="{45FFC59F-235C-8017-D2A9-19A8A33A5B0A}"/>
+              </a:ext>
+            </a:extLst>
+          </p:cNvPr>
+          <p:cNvPicPr>
+            <a:picLocks noChangeAspect="1"/>
+          </p:cNvPicPr>
+          <p:nvPr/>
+        </p:nvPicPr>
+        <p:blipFill>
+          <a:blip r:embed="rId2"/>
+          <a:stretch>
+            <a:fillRect/>
+          </a:stretch>
+        </p:blipFill>
+        <p:spPr>
+          <a:xfrm>
+            <a:off x="997340" y="2471279"/>
+            <a:ext cx="4516045" cy="1113258"/>
+          </a:xfrm>
+          <a:prstGeom prst="rect">
+            <a:avLst/>
+          </a:prstGeom>
+        </p:spPr>
+      </p:pic>
+      <p:pic>
+        <p:nvPicPr>
+          <p:cNvPr id="9" name="Imagem 8">
+            <a:extLst>
+              <a:ext uri="{FF2B5EF4-FFF2-40B4-BE49-F238E27FC236}">
+                <a16:creationId xmlns:a16="http://schemas.microsoft.com/office/drawing/2014/main" id="{FA09AC5C-BCF0-F0FF-F9CB-26F162ADB197}"/>
+              </a:ext>
+            </a:extLst>
+          </p:cNvPr>
+          <p:cNvPicPr>
+            <a:picLocks noChangeAspect="1"/>
+          </p:cNvPicPr>
+          <p:nvPr/>
+        </p:nvPicPr>
+        <p:blipFill>
+          <a:blip r:embed="rId3"/>
+          <a:stretch>
+            <a:fillRect/>
+          </a:stretch>
+        </p:blipFill>
+        <p:spPr>
+          <a:xfrm>
+            <a:off x="8075754" y="2471279"/>
+            <a:ext cx="3118906" cy="831708"/>
+          </a:xfrm>
+          <a:prstGeom prst="rect">
+            <a:avLst/>
+          </a:prstGeom>
+        </p:spPr>
+      </p:pic>
+      <p:pic>
+        <p:nvPicPr>
+          <p:cNvPr id="13" name="Imagem 12">
+            <a:extLst>
+              <a:ext uri="{FF2B5EF4-FFF2-40B4-BE49-F238E27FC236}">
+                <a16:creationId xmlns:a16="http://schemas.microsoft.com/office/drawing/2014/main" id="{C8696075-0F10-18C3-C5C0-DBE74843C4F5}"/>
+              </a:ext>
+            </a:extLst>
+          </p:cNvPr>
+          <p:cNvPicPr>
+            <a:picLocks noChangeAspect="1"/>
+          </p:cNvPicPr>
+          <p:nvPr/>
+        </p:nvPicPr>
+        <p:blipFill>
+          <a:blip r:embed="rId4"/>
+          <a:stretch>
+            <a:fillRect/>
+          </a:stretch>
+        </p:blipFill>
+        <p:spPr>
+          <a:xfrm>
+            <a:off x="1975526" y="3875027"/>
+            <a:ext cx="3444305" cy="759918"/>
+          </a:xfrm>
+          <a:prstGeom prst="rect">
+            <a:avLst/>
+          </a:prstGeom>
+        </p:spPr>
+      </p:pic>
+      <p:pic>
+        <p:nvPicPr>
+          <p:cNvPr id="17" name="Imagem 16">
+            <a:extLst>
+              <a:ext uri="{FF2B5EF4-FFF2-40B4-BE49-F238E27FC236}">
+                <a16:creationId xmlns:a16="http://schemas.microsoft.com/office/drawing/2014/main" id="{4C421EDA-CB64-D425-BAFF-BEE9D7DEB433}"/>
+              </a:ext>
+            </a:extLst>
+          </p:cNvPr>
+          <p:cNvPicPr>
+            <a:picLocks noChangeAspect="1"/>
+          </p:cNvPicPr>
+          <p:nvPr/>
+        </p:nvPicPr>
+        <p:blipFill>
+          <a:blip r:embed="rId5"/>
+          <a:stretch>
+            <a:fillRect/>
+          </a:stretch>
+        </p:blipFill>
+        <p:spPr>
+          <a:xfrm>
+            <a:off x="6634748" y="3762472"/>
+            <a:ext cx="3275339" cy="858364"/>
+          </a:xfrm>
+          <a:prstGeom prst="rect">
+            <a:avLst/>
+          </a:prstGeom>
+        </p:spPr>
+      </p:pic>
+      <p:pic>
+        <p:nvPicPr>
+          <p:cNvPr id="21" name="Imagem 20">
+            <a:extLst>
+              <a:ext uri="{FF2B5EF4-FFF2-40B4-BE49-F238E27FC236}">
+                <a16:creationId xmlns:a16="http://schemas.microsoft.com/office/drawing/2014/main" id="{8F7E5EF2-AF64-971E-660D-F8FEEA88D080}"/>
+              </a:ext>
+            </a:extLst>
+          </p:cNvPr>
+          <p:cNvPicPr>
+            <a:picLocks noChangeAspect="1"/>
+          </p:cNvPicPr>
+          <p:nvPr/>
+        </p:nvPicPr>
+        <p:blipFill>
+          <a:blip r:embed="rId6"/>
+          <a:stretch>
+            <a:fillRect/>
+          </a:stretch>
+        </p:blipFill>
+        <p:spPr>
+          <a:xfrm>
+            <a:off x="1412711" y="5362075"/>
+            <a:ext cx="4169069" cy="722638"/>
+          </a:xfrm>
+          <a:prstGeom prst="rect">
+            <a:avLst/>
+          </a:prstGeom>
+        </p:spPr>
+      </p:pic>
+      <p:pic>
+        <p:nvPicPr>
+          <p:cNvPr id="25" name="Imagem 24">
+            <a:extLst>
+              <a:ext uri="{FF2B5EF4-FFF2-40B4-BE49-F238E27FC236}">
+                <a16:creationId xmlns:a16="http://schemas.microsoft.com/office/drawing/2014/main" id="{06AF254C-69A2-C877-44B9-135C59B55D12}"/>
+              </a:ext>
+            </a:extLst>
+          </p:cNvPr>
+          <p:cNvPicPr>
+            <a:picLocks noChangeAspect="1"/>
+          </p:cNvPicPr>
+          <p:nvPr/>
+        </p:nvPicPr>
+        <p:blipFill>
+          <a:blip r:embed="rId7"/>
+          <a:stretch>
+            <a:fillRect/>
+          </a:stretch>
+        </p:blipFill>
+        <p:spPr>
+          <a:xfrm>
+            <a:off x="7366002" y="4973878"/>
+            <a:ext cx="3275337" cy="858364"/>
+          </a:xfrm>
+          <a:prstGeom prst="rect">
+            <a:avLst/>
+          </a:prstGeom>
+        </p:spPr>
+      </p:pic>
+    </p:spTree>
+    <p:extLst>
+      <p:ext uri="{BB962C8B-B14F-4D97-AF65-F5344CB8AC3E}">
+        <p14:creationId xmlns:p14="http://schemas.microsoft.com/office/powerpoint/2010/main" val="3983568358"/>
+      </p:ext>
+    </p:extLst>
+  </p:cSld>
+  <p:clrMapOvr>
+    <a:masterClrMapping/>
+  </p:clrMapOvr>
+</p:sld>
+</file>
+
+<file path=ppt/slides/slide9.xml><?xml version="1.0" encoding="utf-8"?>
+<p:sld xmlns:a="http://schemas.openxmlformats.org/drawingml/2006/main" xmlns:r="http://schemas.openxmlformats.org/officeDocument/2006/relationships" xmlns:p="http://schemas.openxmlformats.org/presentationml/2006/main">
+  <p:cSld>
+    <p:spTree>
+      <p:nvGrpSpPr>
+        <p:cNvPr id="1" name=""/>
+        <p:cNvGrpSpPr/>
+        <p:nvPr/>
+      </p:nvGrpSpPr>
+      <p:grpSpPr>
+        <a:xfrm>
+          <a:off x="0" y="0"/>
+          <a:ext cx="0" cy="0"/>
+          <a:chOff x="0" y="0"/>
+          <a:chExt cx="0" cy="0"/>
+        </a:xfrm>
+      </p:grpSpPr>
+      <p:sp>
+        <p:nvSpPr>
+          <p:cNvPr id="5" name="Slide Number Placeholder 4">
+            <a:extLst>
+              <a:ext uri="{FF2B5EF4-FFF2-40B4-BE49-F238E27FC236}">
+                <a16:creationId xmlns:a16="http://schemas.microsoft.com/office/drawing/2014/main" id="{78138769-92F5-4A6E-6BE7-4DD65A86294D}"/>
               </a:ext>
             </a:extLst>
           </p:cNvPr>
@@ -8506,12 +9468,7 @@
             <p:ph type="sldNum" sz="quarter" idx="12"/>
           </p:nvPr>
         </p:nvSpPr>
-        <p:spPr>
-          <a:xfrm>
-            <a:off x="9579428" y="6356350"/>
-            <a:ext cx="1774371" cy="365125"/>
-          </a:xfrm>
-        </p:spPr>
+        <p:spPr/>
         <p:txBody>
           <a:bodyPr/>
           <a:lstStyle/>
@@ -8519,16 +9476,217 @@
             <a:fld id="{A49DFD55-3C28-40EF-9E31-A92D2E4017FF}" type="slidenum">
               <a:rPr lang="en-US" smtClean="0"/>
               <a:pPr/>
-              <a:t>8</a:t>
+              <a:t>9</a:t>
             </a:fld>
             <a:endParaRPr lang="en-US" dirty="0"/>
           </a:p>
         </p:txBody>
       </p:sp>
+      <p:sp>
+        <p:nvSpPr>
+          <p:cNvPr id="11" name="TextBox 10">
+            <a:extLst>
+              <a:ext uri="{FF2B5EF4-FFF2-40B4-BE49-F238E27FC236}">
+                <a16:creationId xmlns:a16="http://schemas.microsoft.com/office/drawing/2014/main" id="{9C50F531-062B-30A8-0EFA-1828B8452648}"/>
+              </a:ext>
+            </a:extLst>
+          </p:cNvPr>
+          <p:cNvSpPr txBox="1"/>
+          <p:nvPr/>
+        </p:nvSpPr>
+        <p:spPr>
+          <a:xfrm>
+            <a:off x="916533" y="1185841"/>
+            <a:ext cx="7798259" cy="923330"/>
+          </a:xfrm>
+          <a:prstGeom prst="rect">
+            <a:avLst/>
+          </a:prstGeom>
+          <a:noFill/>
+        </p:spPr>
+        <p:txBody>
+          <a:bodyPr wrap="square">
+            <a:spAutoFit/>
+          </a:bodyPr>
+          <a:lstStyle/>
+          <a:p>
+            <a:r>
+              <a:rPr lang="en-US" dirty="0"/>
+              <a:t>We use getters in specific cases to extract elements of an expression.</a:t>
+            </a:r>
+          </a:p>
+          <a:p>
+            <a:endParaRPr lang="en-US" dirty="0"/>
+          </a:p>
+          <a:p>
+            <a:r>
+              <a:rPr lang="en-US" dirty="0"/>
+              <a:t>This leads to a clean design and better maintainability.</a:t>
+            </a:r>
+          </a:p>
+        </p:txBody>
+      </p:sp>
+      <p:sp>
+        <p:nvSpPr>
+          <p:cNvPr id="13" name="TextBox 12">
+            <a:extLst>
+              <a:ext uri="{FF2B5EF4-FFF2-40B4-BE49-F238E27FC236}">
+                <a16:creationId xmlns:a16="http://schemas.microsoft.com/office/drawing/2014/main" id="{853145E0-382C-887A-9444-68B889CA5382}"/>
+              </a:ext>
+            </a:extLst>
+          </p:cNvPr>
+          <p:cNvSpPr txBox="1"/>
+          <p:nvPr/>
+        </p:nvSpPr>
+        <p:spPr>
+          <a:xfrm>
+            <a:off x="1778000" y="517132"/>
+            <a:ext cx="6096000" cy="369332"/>
+          </a:xfrm>
+          <a:prstGeom prst="rect">
+            <a:avLst/>
+          </a:prstGeom>
+          <a:noFill/>
+        </p:spPr>
+        <p:txBody>
+          <a:bodyPr wrap="square">
+            <a:spAutoFit/>
+          </a:bodyPr>
+          <a:lstStyle/>
+          <a:p>
+            <a:r>
+              <a:rPr lang="en-US" b="1" dirty="0">
+                <a:latin typeface="+mj-lt"/>
+              </a:rPr>
+              <a:t>Getters</a:t>
+            </a:r>
+          </a:p>
+        </p:txBody>
+      </p:sp>
+      <p:pic>
+        <p:nvPicPr>
+          <p:cNvPr id="3" name="Imagem 2">
+            <a:extLst>
+              <a:ext uri="{FF2B5EF4-FFF2-40B4-BE49-F238E27FC236}">
+                <a16:creationId xmlns:a16="http://schemas.microsoft.com/office/drawing/2014/main" id="{441AC397-1595-751C-F08D-B8911374055D}"/>
+              </a:ext>
+            </a:extLst>
+          </p:cNvPr>
+          <p:cNvPicPr>
+            <a:picLocks noChangeAspect="1"/>
+          </p:cNvPicPr>
+          <p:nvPr/>
+        </p:nvPicPr>
+        <p:blipFill>
+          <a:blip r:embed="rId2"/>
+          <a:stretch>
+            <a:fillRect/>
+          </a:stretch>
+        </p:blipFill>
+        <p:spPr>
+          <a:xfrm>
+            <a:off x="1053356" y="5058824"/>
+            <a:ext cx="3858163" cy="724001"/>
+          </a:xfrm>
+          <a:prstGeom prst="rect">
+            <a:avLst/>
+          </a:prstGeom>
+        </p:spPr>
+      </p:pic>
+      <p:pic>
+        <p:nvPicPr>
+          <p:cNvPr id="6" name="Imagem 5">
+            <a:extLst>
+              <a:ext uri="{FF2B5EF4-FFF2-40B4-BE49-F238E27FC236}">
+                <a16:creationId xmlns:a16="http://schemas.microsoft.com/office/drawing/2014/main" id="{07B70261-ED61-2151-3805-71CEC7354C7C}"/>
+              </a:ext>
+            </a:extLst>
+          </p:cNvPr>
+          <p:cNvPicPr>
+            <a:picLocks noChangeAspect="1"/>
+          </p:cNvPicPr>
+          <p:nvPr/>
+        </p:nvPicPr>
+        <p:blipFill>
+          <a:blip r:embed="rId3"/>
+          <a:stretch>
+            <a:fillRect/>
+          </a:stretch>
+        </p:blipFill>
+        <p:spPr>
+          <a:xfrm>
+            <a:off x="1053356" y="3672605"/>
+            <a:ext cx="4001058" cy="1181265"/>
+          </a:xfrm>
+          <a:prstGeom prst="rect">
+            <a:avLst/>
+          </a:prstGeom>
+        </p:spPr>
+      </p:pic>
+      <p:pic>
+        <p:nvPicPr>
+          <p:cNvPr id="10" name="Imagem 9">
+            <a:extLst>
+              <a:ext uri="{FF2B5EF4-FFF2-40B4-BE49-F238E27FC236}">
+                <a16:creationId xmlns:a16="http://schemas.microsoft.com/office/drawing/2014/main" id="{817F544D-5C8A-E90D-046E-8EBE382CD298}"/>
+              </a:ext>
+            </a:extLst>
+          </p:cNvPr>
+          <p:cNvPicPr>
+            <a:picLocks noChangeAspect="1"/>
+          </p:cNvPicPr>
+          <p:nvPr/>
+        </p:nvPicPr>
+        <p:blipFill>
+          <a:blip r:embed="rId4"/>
+          <a:stretch>
+            <a:fillRect/>
+          </a:stretch>
+        </p:blipFill>
+        <p:spPr>
+          <a:xfrm>
+            <a:off x="1053356" y="2676966"/>
+            <a:ext cx="4105848" cy="790685"/>
+          </a:xfrm>
+          <a:prstGeom prst="rect">
+            <a:avLst/>
+          </a:prstGeom>
+        </p:spPr>
+      </p:pic>
+      <p:pic>
+        <p:nvPicPr>
+          <p:cNvPr id="14" name="Imagem 13">
+            <a:extLst>
+              <a:ext uri="{FF2B5EF4-FFF2-40B4-BE49-F238E27FC236}">
+                <a16:creationId xmlns:a16="http://schemas.microsoft.com/office/drawing/2014/main" id="{50280644-8E92-9DA6-82CF-8E5FA44B6600}"/>
+              </a:ext>
+            </a:extLst>
+          </p:cNvPr>
+          <p:cNvPicPr>
+            <a:picLocks noChangeAspect="1"/>
+          </p:cNvPicPr>
+          <p:nvPr/>
+        </p:nvPicPr>
+        <p:blipFill>
+          <a:blip r:embed="rId5"/>
+          <a:stretch>
+            <a:fillRect/>
+          </a:stretch>
+        </p:blipFill>
+        <p:spPr>
+          <a:xfrm>
+            <a:off x="6400468" y="3072308"/>
+            <a:ext cx="5144218" cy="2124371"/>
+          </a:xfrm>
+          <a:prstGeom prst="rect">
+            <a:avLst/>
+          </a:prstGeom>
+        </p:spPr>
+      </p:pic>
     </p:spTree>
     <p:extLst>
       <p:ext uri="{BB962C8B-B14F-4D97-AF65-F5344CB8AC3E}">
-        <p14:creationId xmlns:p14="http://schemas.microsoft.com/office/powerpoint/2010/main" val="1969787568"/>
+        <p14:creationId xmlns:p14="http://schemas.microsoft.com/office/powerpoint/2010/main" val="3065301659"/>
       </p:ext>
     </p:extLst>
   </p:cSld>
@@ -9330,6 +10488,15 @@
 </file>
 
 <file path=customXml/item1.xml><?xml version="1.0" encoding="utf-8"?>
+<?mso-contentType ?>
+<FormTemplates xmlns="http://schemas.microsoft.com/sharepoint/v3/contenttype/forms">
+  <Display>DocumentLibraryForm</Display>
+  <Edit>DocumentLibraryForm</Edit>
+  <New>DocumentLibraryForm</New>
+</FormTemplates>
+</file>
+
+<file path=customXml/item2.xml><?xml version="1.0" encoding="utf-8"?>
 <p:properties xmlns:p="http://schemas.microsoft.com/office/2006/metadata/properties" xmlns:xsi="http://www.w3.org/2001/XMLSchema-instance" xmlns:pc="http://schemas.microsoft.com/office/infopath/2007/PartnerControls">
   <documentManagement>
     <_ip_UnifiedCompliancePolicyUIAction xmlns="http://schemas.microsoft.com/sharepoint/v3" xsi:nil="true"/>
@@ -9347,15 +10514,6 @@
     <MediaServiceKeyPoints xmlns="71af3243-3dd4-4a8d-8c0d-dd76da1f02a5" xsi:nil="true"/>
   </documentManagement>
 </p:properties>
-</file>
-
-<file path=customXml/item2.xml><?xml version="1.0" encoding="utf-8"?>
-<?mso-contentType ?>
-<FormTemplates xmlns="http://schemas.microsoft.com/sharepoint/v3/contenttype/forms">
-  <Display>DocumentLibraryForm</Display>
-  <Edit>DocumentLibraryForm</Edit>
-  <New>DocumentLibraryForm</New>
-</FormTemplates>
 </file>
 
 <file path=customXml/item3.xml><?xml version="1.0" encoding="utf-8"?>
@@ -9671,6 +10829,14 @@
 </file>
 
 <file path=customXml/itemProps1.xml><?xml version="1.0" encoding="utf-8"?>
+<ds:datastoreItem xmlns:ds="http://schemas.openxmlformats.org/officeDocument/2006/customXml" ds:itemID="{CABF691C-888B-4061-8A6F-D5CE84A0254B}">
+  <ds:schemaRefs>
+    <ds:schemaRef ds:uri="http://schemas.microsoft.com/sharepoint/v3/contenttype/forms"/>
+  </ds:schemaRefs>
+</ds:datastoreItem>
+</file>
+
+<file path=customXml/itemProps2.xml><?xml version="1.0" encoding="utf-8"?>
 <ds:datastoreItem xmlns:ds="http://schemas.openxmlformats.org/officeDocument/2006/customXml" ds:itemID="{49168DCE-134F-4610-A6AA-88CEBE8D71D2}">
   <ds:schemaRefs>
     <ds:schemaRef ds:uri="http://schemas.microsoft.com/office/2006/metadata/properties"/>
@@ -9678,14 +10844,6 @@
     <ds:schemaRef ds:uri="http://schemas.microsoft.com/sharepoint/v3"/>
     <ds:schemaRef ds:uri="71af3243-3dd4-4a8d-8c0d-dd76da1f02a5"/>
     <ds:schemaRef ds:uri="230e9df3-be65-4c73-a93b-d1236ebd677e"/>
-  </ds:schemaRefs>
-</ds:datastoreItem>
-</file>
-
-<file path=customXml/itemProps2.xml><?xml version="1.0" encoding="utf-8"?>
-<ds:datastoreItem xmlns:ds="http://schemas.openxmlformats.org/officeDocument/2006/customXml" ds:itemID="{CABF691C-888B-4061-8A6F-D5CE84A0254B}">
-  <ds:schemaRefs>
-    <ds:schemaRef ds:uri="http://schemas.microsoft.com/sharepoint/v3/contenttype/forms"/>
   </ds:schemaRefs>
 </ds:datastoreItem>
 </file>

</xml_diff>